<commit_message>
add clustering short explanation in pptx
</commit_message>
<xml_diff>
--- a/Orange_explanation.pptx
+++ b/Orange_explanation.pptx
@@ -27,6 +27,7 @@
     <p:sldId id="272" r:id="rId21"/>
     <p:sldId id="274" r:id="rId22"/>
     <p:sldId id="273" r:id="rId23"/>
+    <p:sldId id="278" r:id="rId24"/>
   </p:sldIdLst>
   <p:sldSz cx="12192000" cy="6858000"/>
   <p:notesSz cx="6858000" cy="9144000"/>
@@ -264,7 +265,7 @@
           <a:p>
             <a:fld id="{24976475-CF4B-4E06-9C6E-E5FC67DC0A34}" type="datetimeFigureOut">
               <a:rPr kumimoji="1" lang="ja-JP" altLang="en-US" smtClean="0"/>
-              <a:t>2016/9/21</a:t>
+              <a:t>2016/9/28</a:t>
             </a:fld>
             <a:endParaRPr kumimoji="1" lang="ja-JP" altLang="en-US"/>
           </a:p>
@@ -466,7 +467,7 @@
           <a:p>
             <a:fld id="{24976475-CF4B-4E06-9C6E-E5FC67DC0A34}" type="datetimeFigureOut">
               <a:rPr kumimoji="1" lang="ja-JP" altLang="en-US" smtClean="0"/>
-              <a:t>2016/9/21</a:t>
+              <a:t>2016/9/28</a:t>
             </a:fld>
             <a:endParaRPr kumimoji="1" lang="ja-JP" altLang="en-US"/>
           </a:p>
@@ -678,7 +679,7 @@
           <a:p>
             <a:fld id="{24976475-CF4B-4E06-9C6E-E5FC67DC0A34}" type="datetimeFigureOut">
               <a:rPr kumimoji="1" lang="ja-JP" altLang="en-US" smtClean="0"/>
-              <a:t>2016/9/21</a:t>
+              <a:t>2016/9/28</a:t>
             </a:fld>
             <a:endParaRPr kumimoji="1" lang="ja-JP" altLang="en-US"/>
           </a:p>
@@ -880,7 +881,7 @@
           <a:p>
             <a:fld id="{24976475-CF4B-4E06-9C6E-E5FC67DC0A34}" type="datetimeFigureOut">
               <a:rPr kumimoji="1" lang="ja-JP" altLang="en-US" smtClean="0"/>
-              <a:t>2016/9/21</a:t>
+              <a:t>2016/9/28</a:t>
             </a:fld>
             <a:endParaRPr kumimoji="1" lang="ja-JP" altLang="en-US"/>
           </a:p>
@@ -1126,7 +1127,7 @@
           <a:p>
             <a:fld id="{24976475-CF4B-4E06-9C6E-E5FC67DC0A34}" type="datetimeFigureOut">
               <a:rPr kumimoji="1" lang="ja-JP" altLang="en-US" smtClean="0"/>
-              <a:t>2016/9/21</a:t>
+              <a:t>2016/9/28</a:t>
             </a:fld>
             <a:endParaRPr kumimoji="1" lang="ja-JP" altLang="en-US"/>
           </a:p>
@@ -1422,7 +1423,7 @@
           <a:p>
             <a:fld id="{24976475-CF4B-4E06-9C6E-E5FC67DC0A34}" type="datetimeFigureOut">
               <a:rPr kumimoji="1" lang="ja-JP" altLang="en-US" smtClean="0"/>
-              <a:t>2016/9/21</a:t>
+              <a:t>2016/9/28</a:t>
             </a:fld>
             <a:endParaRPr kumimoji="1" lang="ja-JP" altLang="en-US"/>
           </a:p>
@@ -1853,7 +1854,7 @@
           <a:p>
             <a:fld id="{24976475-CF4B-4E06-9C6E-E5FC67DC0A34}" type="datetimeFigureOut">
               <a:rPr kumimoji="1" lang="ja-JP" altLang="en-US" smtClean="0"/>
-              <a:t>2016/9/21</a:t>
+              <a:t>2016/9/28</a:t>
             </a:fld>
             <a:endParaRPr kumimoji="1" lang="ja-JP" altLang="en-US"/>
           </a:p>
@@ -1971,7 +1972,7 @@
           <a:p>
             <a:fld id="{24976475-CF4B-4E06-9C6E-E5FC67DC0A34}" type="datetimeFigureOut">
               <a:rPr kumimoji="1" lang="ja-JP" altLang="en-US" smtClean="0"/>
-              <a:t>2016/9/21</a:t>
+              <a:t>2016/9/28</a:t>
             </a:fld>
             <a:endParaRPr kumimoji="1" lang="ja-JP" altLang="en-US"/>
           </a:p>
@@ -2066,7 +2067,7 @@
           <a:p>
             <a:fld id="{24976475-CF4B-4E06-9C6E-E5FC67DC0A34}" type="datetimeFigureOut">
               <a:rPr kumimoji="1" lang="ja-JP" altLang="en-US" smtClean="0"/>
-              <a:t>2016/9/21</a:t>
+              <a:t>2016/9/28</a:t>
             </a:fld>
             <a:endParaRPr kumimoji="1" lang="ja-JP" altLang="en-US"/>
           </a:p>
@@ -2375,7 +2376,7 @@
           <a:p>
             <a:fld id="{24976475-CF4B-4E06-9C6E-E5FC67DC0A34}" type="datetimeFigureOut">
               <a:rPr kumimoji="1" lang="ja-JP" altLang="en-US" smtClean="0"/>
-              <a:t>2016/9/21</a:t>
+              <a:t>2016/9/28</a:t>
             </a:fld>
             <a:endParaRPr kumimoji="1" lang="ja-JP" altLang="en-US"/>
           </a:p>
@@ -2628,7 +2629,7 @@
           <a:p>
             <a:fld id="{24976475-CF4B-4E06-9C6E-E5FC67DC0A34}" type="datetimeFigureOut">
               <a:rPr kumimoji="1" lang="ja-JP" altLang="en-US" smtClean="0"/>
-              <a:t>2016/9/21</a:t>
+              <a:t>2016/9/28</a:t>
             </a:fld>
             <a:endParaRPr kumimoji="1" lang="ja-JP" altLang="en-US"/>
           </a:p>
@@ -2873,7 +2874,7 @@
           <a:p>
             <a:fld id="{24976475-CF4B-4E06-9C6E-E5FC67DC0A34}" type="datetimeFigureOut">
               <a:rPr kumimoji="1" lang="ja-JP" altLang="en-US" smtClean="0"/>
-              <a:t>2016/9/21</a:t>
+              <a:t>2016/9/28</a:t>
             </a:fld>
             <a:endParaRPr kumimoji="1" lang="ja-JP" altLang="en-US"/>
           </a:p>
@@ -3333,15 +3334,7 @@
           <a:p>
             <a:r>
               <a:rPr lang="en-US" altLang="ja-JP" dirty="0" smtClean="0"/>
-              <a:t>Sep. 16</a:t>
-            </a:r>
-            <a:r>
-              <a:rPr lang="en-US" altLang="ja-JP" dirty="0" smtClean="0"/>
-              <a:t>, </a:t>
-            </a:r>
-            <a:r>
-              <a:rPr lang="en-US" altLang="ja-JP" dirty="0" smtClean="0"/>
-              <a:t>2016</a:t>
+              <a:t>Sep. 16, 2016</a:t>
             </a:r>
           </a:p>
           <a:p>
@@ -4986,7 +4979,7 @@
         </p:nvSpPr>
         <p:spPr>
           <a:xfrm>
-            <a:off x="6623823" y="1817649"/>
+            <a:off x="8517938" y="1284249"/>
             <a:ext cx="1672683" cy="646331"/>
           </a:xfrm>
           <a:prstGeom prst="rect">
@@ -7745,6 +7738,92 @@
     <p:extLst>
       <p:ext uri="{BB962C8B-B14F-4D97-AF65-F5344CB8AC3E}">
         <p14:creationId xmlns:p14="http://schemas.microsoft.com/office/powerpoint/2010/main" val="2687270568"/>
+      </p:ext>
+    </p:extLst>
+  </p:cSld>
+  <p:clrMapOvr>
+    <a:masterClrMapping/>
+  </p:clrMapOvr>
+</p:sld>
+</file>
+
+<file path=ppt/slides/slide23.xml><?xml version="1.0" encoding="utf-8"?>
+<p:sld xmlns:a="http://schemas.openxmlformats.org/drawingml/2006/main" xmlns:r="http://schemas.openxmlformats.org/officeDocument/2006/relationships" xmlns:p="http://schemas.openxmlformats.org/presentationml/2006/main">
+  <p:cSld>
+    <p:spTree>
+      <p:nvGrpSpPr>
+        <p:cNvPr id="1" name=""/>
+        <p:cNvGrpSpPr/>
+        <p:nvPr/>
+      </p:nvGrpSpPr>
+      <p:grpSpPr>
+        <a:xfrm>
+          <a:off x="0" y="0"/>
+          <a:ext cx="0" cy="0"/>
+          <a:chOff x="0" y="0"/>
+          <a:chExt cx="0" cy="0"/>
+        </a:xfrm>
+      </p:grpSpPr>
+      <p:sp>
+        <p:nvSpPr>
+          <p:cNvPr id="2" name="タイトル 1"/>
+          <p:cNvSpPr>
+            <a:spLocks noGrp="1"/>
+          </p:cNvSpPr>
+          <p:nvPr>
+            <p:ph type="title"/>
+          </p:nvPr>
+        </p:nvSpPr>
+        <p:spPr>
+          <a:xfrm>
+            <a:off x="793595" y="0"/>
+            <a:ext cx="10515600" cy="1325563"/>
+          </a:xfrm>
+        </p:spPr>
+        <p:txBody>
+          <a:bodyPr/>
+          <a:lstStyle/>
+          <a:p>
+            <a:r>
+              <a:rPr kumimoji="1" lang="en-US" altLang="ja-JP" dirty="0" smtClean="0"/>
+              <a:t>Clustering</a:t>
+            </a:r>
+            <a:r>
+              <a:rPr kumimoji="1" lang="ja-JP" altLang="en-US" dirty="0" smtClean="0"/>
+              <a:t>の例</a:t>
+            </a:r>
+            <a:endParaRPr kumimoji="1" lang="ja-JP" altLang="en-US" dirty="0"/>
+          </a:p>
+        </p:txBody>
+      </p:sp>
+      <p:pic>
+        <p:nvPicPr>
+          <p:cNvPr id="4" name="図 3"/>
+          <p:cNvPicPr>
+            <a:picLocks noChangeAspect="1"/>
+          </p:cNvPicPr>
+          <p:nvPr/>
+        </p:nvPicPr>
+        <p:blipFill>
+          <a:blip r:embed="rId2"/>
+          <a:stretch>
+            <a:fillRect/>
+          </a:stretch>
+        </p:blipFill>
+        <p:spPr>
+          <a:xfrm>
+            <a:off x="2107581" y="992458"/>
+            <a:ext cx="6244968" cy="5765181"/>
+          </a:xfrm>
+          <a:prstGeom prst="rect">
+            <a:avLst/>
+          </a:prstGeom>
+        </p:spPr>
+      </p:pic>
+    </p:spTree>
+    <p:extLst>
+      <p:ext uri="{BB962C8B-B14F-4D97-AF65-F5344CB8AC3E}">
+        <p14:creationId xmlns:p14="http://schemas.microsoft.com/office/powerpoint/2010/main" val="3443948303"/>
       </p:ext>
     </p:extLst>
   </p:cSld>

</xml_diff>

<commit_message>
training/test set ows and pptx updated
</commit_message>
<xml_diff>
--- a/Orange_explanation.pptx
+++ b/Orange_explanation.pptx
@@ -15,19 +15,26 @@
     <p:sldId id="262" r:id="rId9"/>
     <p:sldId id="263" r:id="rId10"/>
     <p:sldId id="264" r:id="rId11"/>
-    <p:sldId id="266" r:id="rId12"/>
-    <p:sldId id="275" r:id="rId13"/>
-    <p:sldId id="276" r:id="rId14"/>
-    <p:sldId id="267" r:id="rId15"/>
-    <p:sldId id="268" r:id="rId16"/>
-    <p:sldId id="269" r:id="rId17"/>
-    <p:sldId id="270" r:id="rId18"/>
-    <p:sldId id="277" r:id="rId19"/>
-    <p:sldId id="271" r:id="rId20"/>
-    <p:sldId id="272" r:id="rId21"/>
-    <p:sldId id="274" r:id="rId22"/>
-    <p:sldId id="273" r:id="rId23"/>
-    <p:sldId id="278" r:id="rId24"/>
+    <p:sldId id="279" r:id="rId12"/>
+    <p:sldId id="283" r:id="rId13"/>
+    <p:sldId id="281" r:id="rId14"/>
+    <p:sldId id="282" r:id="rId15"/>
+    <p:sldId id="285" r:id="rId16"/>
+    <p:sldId id="266" r:id="rId17"/>
+    <p:sldId id="275" r:id="rId18"/>
+    <p:sldId id="276" r:id="rId19"/>
+    <p:sldId id="267" r:id="rId20"/>
+    <p:sldId id="268" r:id="rId21"/>
+    <p:sldId id="269" r:id="rId22"/>
+    <p:sldId id="270" r:id="rId23"/>
+    <p:sldId id="277" r:id="rId24"/>
+    <p:sldId id="271" r:id="rId25"/>
+    <p:sldId id="272" r:id="rId26"/>
+    <p:sldId id="274" r:id="rId27"/>
+    <p:sldId id="284" r:id="rId28"/>
+    <p:sldId id="273" r:id="rId29"/>
+    <p:sldId id="280" r:id="rId30"/>
+    <p:sldId id="278" r:id="rId31"/>
   </p:sldIdLst>
   <p:sldSz cx="12192000" cy="6858000"/>
   <p:notesSz cx="6858000" cy="9144000"/>
@@ -3505,8 +3512,8 @@
         </p:nvCxnSpPr>
         <p:spPr>
           <a:xfrm flipH="1">
-            <a:off x="4114800" y="3592286"/>
-            <a:ext cx="762000" cy="849085"/>
+            <a:off x="3980985" y="4047893"/>
+            <a:ext cx="1148576" cy="538444"/>
           </a:xfrm>
           <a:prstGeom prst="line">
             <a:avLst/>
@@ -3532,6 +3539,87 @@
           </a:fontRef>
         </p:style>
       </p:cxnSp>
+      <p:sp>
+        <p:nvSpPr>
+          <p:cNvPr id="2" name="テキスト ボックス 1"/>
+          <p:cNvSpPr txBox="1"/>
+          <p:nvPr/>
+        </p:nvSpPr>
+        <p:spPr>
+          <a:xfrm>
+            <a:off x="4739267" y="4728117"/>
+            <a:ext cx="2263700" cy="646331"/>
+          </a:xfrm>
+          <a:prstGeom prst="rect">
+            <a:avLst/>
+          </a:prstGeom>
+          <a:noFill/>
+        </p:spPr>
+        <p:txBody>
+          <a:bodyPr wrap="square" rtlCol="0">
+            <a:spAutoFit/>
+          </a:bodyPr>
+          <a:lstStyle/>
+          <a:p>
+            <a:r>
+              <a:rPr kumimoji="1" lang="en-US" altLang="ja-JP" dirty="0" smtClean="0"/>
+              <a:t>Orange</a:t>
+            </a:r>
+            <a:r>
+              <a:rPr kumimoji="1" lang="ja-JP" altLang="en-US" dirty="0" smtClean="0"/>
+              <a:t>でエラーは起きるが表示可能。</a:t>
+            </a:r>
+            <a:endParaRPr kumimoji="1" lang="ja-JP" altLang="en-US" dirty="0"/>
+          </a:p>
+        </p:txBody>
+      </p:sp>
+      <p:sp>
+        <p:nvSpPr>
+          <p:cNvPr id="8" name="正方形/長方形 7"/>
+          <p:cNvSpPr/>
+          <p:nvPr/>
+        </p:nvSpPr>
+        <p:spPr>
+          <a:xfrm>
+            <a:off x="4895385" y="3211551"/>
+            <a:ext cx="1170878" cy="1393903"/>
+          </a:xfrm>
+          <a:prstGeom prst="rect">
+            <a:avLst/>
+          </a:prstGeom>
+          <a:noFill/>
+          <a:ln>
+            <a:solidFill>
+              <a:srgbClr val="FF0000"/>
+            </a:solidFill>
+            <a:prstDash val="dash"/>
+          </a:ln>
+        </p:spPr>
+        <p:style>
+          <a:lnRef idx="2">
+            <a:schemeClr val="accent1">
+              <a:shade val="50000"/>
+            </a:schemeClr>
+          </a:lnRef>
+          <a:fillRef idx="1">
+            <a:schemeClr val="accent1"/>
+          </a:fillRef>
+          <a:effectRef idx="0">
+            <a:schemeClr val="accent1"/>
+          </a:effectRef>
+          <a:fontRef idx="minor">
+            <a:schemeClr val="lt1"/>
+          </a:fontRef>
+        </p:style>
+        <p:txBody>
+          <a:bodyPr rtlCol="0" anchor="ctr"/>
+          <a:lstStyle/>
+          <a:p>
+            <a:pPr algn="ctr"/>
+            <a:endParaRPr kumimoji="1" lang="ja-JP" altLang="en-US"/>
+          </a:p>
+        </p:txBody>
+      </p:sp>
     </p:spTree>
     <p:extLst>
       <p:ext uri="{BB962C8B-B14F-4D97-AF65-F5344CB8AC3E}">
@@ -3562,6 +3650,30 @@
           <a:chExt cx="0" cy="0"/>
         </a:xfrm>
       </p:grpSpPr>
+      <p:pic>
+        <p:nvPicPr>
+          <p:cNvPr id="23" name="図 22"/>
+          <p:cNvPicPr>
+            <a:picLocks noChangeAspect="1"/>
+          </p:cNvPicPr>
+          <p:nvPr/>
+        </p:nvPicPr>
+        <p:blipFill>
+          <a:blip r:embed="rId2"/>
+          <a:stretch>
+            <a:fillRect/>
+          </a:stretch>
+        </p:blipFill>
+        <p:spPr>
+          <a:xfrm>
+            <a:off x="2175183" y="3360813"/>
+            <a:ext cx="7105650" cy="2924175"/>
+          </a:xfrm>
+          <a:prstGeom prst="rect">
+            <a:avLst/>
+          </a:prstGeom>
+        </p:spPr>
+      </p:pic>
       <p:sp>
         <p:nvSpPr>
           <p:cNvPr id="2" name="タイトル 1"/>
@@ -3574,7 +3686,7 @@
         </p:nvSpPr>
         <p:spPr>
           <a:xfrm>
-            <a:off x="748990" y="2840696"/>
+            <a:off x="860503" y="0"/>
             <a:ext cx="10515600" cy="1325563"/>
           </a:xfrm>
         </p:spPr>
@@ -3582,14 +3694,323 @@
           <a:bodyPr/>
           <a:lstStyle/>
           <a:p>
+            <a:r>
+              <a:rPr kumimoji="1" lang="en-US" altLang="ja-JP" dirty="0" smtClean="0"/>
+              <a:t>Training set</a:t>
+            </a:r>
+            <a:r>
+              <a:rPr kumimoji="1" lang="ja-JP" altLang="en-US" dirty="0" smtClean="0"/>
+              <a:t>と</a:t>
+            </a:r>
+            <a:r>
+              <a:rPr kumimoji="1" lang="en-US" altLang="ja-JP" dirty="0" smtClean="0"/>
+              <a:t>test set</a:t>
+            </a:r>
+            <a:endParaRPr kumimoji="1" lang="ja-JP" altLang="en-US" dirty="0"/>
+          </a:p>
+        </p:txBody>
+      </p:sp>
+      <p:sp>
+        <p:nvSpPr>
+          <p:cNvPr id="3" name="コンテンツ プレースホルダー 2"/>
+          <p:cNvSpPr>
+            <a:spLocks noGrp="1"/>
+          </p:cNvSpPr>
+          <p:nvPr>
+            <p:ph idx="1"/>
+          </p:nvPr>
+        </p:nvSpPr>
+        <p:spPr>
+          <a:xfrm>
+            <a:off x="760142" y="1234610"/>
+            <a:ext cx="10515600" cy="1698161"/>
+          </a:xfrm>
+        </p:spPr>
+        <p:txBody>
+          <a:bodyPr/>
+          <a:lstStyle/>
+          <a:p>
+            <a:pPr marL="514350" indent="-514350">
+              <a:buFont typeface="+mj-lt"/>
+              <a:buAutoNum type="arabicPeriod"/>
+            </a:pPr>
+            <a:r>
+              <a:rPr kumimoji="1" lang="en-US" altLang="ja-JP" dirty="0" smtClean="0"/>
+              <a:t>Training set </a:t>
+            </a:r>
+            <a:r>
+              <a:rPr kumimoji="1" lang="ja-JP" altLang="en-US" dirty="0" smtClean="0"/>
+              <a:t>を用いて　　線形回帰の係数を求める。</a:t>
+            </a:r>
+            <a:endParaRPr kumimoji="1" lang="en-US" altLang="ja-JP" dirty="0" smtClean="0"/>
+          </a:p>
+          <a:p>
+            <a:pPr marL="514350" indent="-514350">
+              <a:buFont typeface="+mj-lt"/>
+              <a:buAutoNum type="arabicPeriod"/>
+            </a:pPr>
+            <a:r>
+              <a:rPr lang="ja-JP" altLang="en-US" dirty="0" smtClean="0"/>
+              <a:t>求めた線形</a:t>
+            </a:r>
+            <a:r>
+              <a:rPr lang="ja-JP" altLang="en-US" dirty="0"/>
+              <a:t>回帰の係数を用いて</a:t>
+            </a:r>
+            <a:endParaRPr kumimoji="1" lang="en-US" altLang="ja-JP" dirty="0" smtClean="0"/>
+          </a:p>
+          <a:p>
+            <a:pPr marL="514350" indent="-514350">
+              <a:buFont typeface="+mj-lt"/>
+              <a:buAutoNum type="arabicPeriod"/>
+            </a:pPr>
+            <a:r>
+              <a:rPr lang="en-US" altLang="ja-JP" dirty="0" smtClean="0"/>
+              <a:t>test set</a:t>
+            </a:r>
+            <a:r>
+              <a:rPr lang="ja-JP" altLang="en-US" dirty="0" smtClean="0"/>
+              <a:t>に対して　　予測する。</a:t>
+            </a:r>
+            <a:endParaRPr kumimoji="1" lang="ja-JP" altLang="en-US" dirty="0"/>
+          </a:p>
+        </p:txBody>
+      </p:sp>
+      <p:sp>
+        <p:nvSpPr>
+          <p:cNvPr id="28" name="正方形/長方形 27"/>
+          <p:cNvSpPr/>
+          <p:nvPr/>
+        </p:nvSpPr>
+        <p:spPr>
+          <a:xfrm>
+            <a:off x="2085278" y="3345366"/>
+            <a:ext cx="6445405" cy="1037063"/>
+          </a:xfrm>
+          <a:prstGeom prst="rect">
+            <a:avLst/>
+          </a:prstGeom>
+          <a:noFill/>
+        </p:spPr>
+        <p:style>
+          <a:lnRef idx="2">
+            <a:schemeClr val="accent1">
+              <a:shade val="50000"/>
+            </a:schemeClr>
+          </a:lnRef>
+          <a:fillRef idx="1">
+            <a:schemeClr val="accent1"/>
+          </a:fillRef>
+          <a:effectRef idx="0">
+            <a:schemeClr val="accent1"/>
+          </a:effectRef>
+          <a:fontRef idx="minor">
+            <a:schemeClr val="lt1"/>
+          </a:fontRef>
+        </p:style>
+        <p:txBody>
+          <a:bodyPr rtlCol="0" anchor="ctr"/>
+          <a:lstStyle/>
+          <a:p>
             <a:pPr algn="ctr"/>
+            <a:endParaRPr kumimoji="1" lang="ja-JP" altLang="en-US"/>
+          </a:p>
+        </p:txBody>
+      </p:sp>
+      <p:sp>
+        <p:nvSpPr>
+          <p:cNvPr id="29" name="正方形/長方形 28"/>
+          <p:cNvSpPr/>
+          <p:nvPr/>
+        </p:nvSpPr>
+        <p:spPr>
+          <a:xfrm>
+            <a:off x="2572215" y="5203903"/>
+            <a:ext cx="6683297" cy="1148575"/>
+          </a:xfrm>
+          <a:prstGeom prst="rect">
+            <a:avLst/>
+          </a:prstGeom>
+          <a:noFill/>
+        </p:spPr>
+        <p:style>
+          <a:lnRef idx="2">
+            <a:schemeClr val="accent1">
+              <a:shade val="50000"/>
+            </a:schemeClr>
+          </a:lnRef>
+          <a:fillRef idx="1">
+            <a:schemeClr val="accent1"/>
+          </a:fillRef>
+          <a:effectRef idx="0">
+            <a:schemeClr val="accent1"/>
+          </a:effectRef>
+          <a:fontRef idx="minor">
+            <a:schemeClr val="lt1"/>
+          </a:fontRef>
+        </p:style>
+        <p:txBody>
+          <a:bodyPr rtlCol="0" anchor="ctr"/>
+          <a:lstStyle/>
+          <a:p>
+            <a:pPr algn="ctr"/>
+            <a:endParaRPr kumimoji="1" lang="ja-JP" altLang="en-US"/>
+          </a:p>
+        </p:txBody>
+      </p:sp>
+      <p:sp>
+        <p:nvSpPr>
+          <p:cNvPr id="30" name="テキスト ボックス 29"/>
+          <p:cNvSpPr txBox="1"/>
+          <p:nvPr/>
+        </p:nvSpPr>
+        <p:spPr>
+          <a:xfrm>
+            <a:off x="1405054" y="3601844"/>
+            <a:ext cx="512956" cy="369332"/>
+          </a:xfrm>
+          <a:prstGeom prst="rect">
+            <a:avLst/>
+          </a:prstGeom>
+          <a:noFill/>
+        </p:spPr>
+        <p:txBody>
+          <a:bodyPr wrap="square" rtlCol="0">
+            <a:spAutoFit/>
+          </a:bodyPr>
+          <a:lstStyle/>
+          <a:p>
             <a:r>
               <a:rPr kumimoji="1" lang="en-US" altLang="ja-JP" dirty="0" smtClean="0"/>
-              <a:t>Classification</a:t>
+              <a:t>1.</a:t>
+            </a:r>
+            <a:endParaRPr kumimoji="1" lang="ja-JP" altLang="en-US" dirty="0"/>
+          </a:p>
+        </p:txBody>
+      </p:sp>
+      <p:sp>
+        <p:nvSpPr>
+          <p:cNvPr id="31" name="テキスト ボックス 30"/>
+          <p:cNvSpPr txBox="1"/>
+          <p:nvPr/>
+        </p:nvSpPr>
+        <p:spPr>
+          <a:xfrm>
+            <a:off x="6006790" y="4557131"/>
+            <a:ext cx="512956" cy="369332"/>
+          </a:xfrm>
+          <a:prstGeom prst="rect">
+            <a:avLst/>
+          </a:prstGeom>
+          <a:noFill/>
+        </p:spPr>
+        <p:txBody>
+          <a:bodyPr wrap="square" rtlCol="0">
+            <a:spAutoFit/>
+          </a:bodyPr>
+          <a:lstStyle/>
+          <a:p>
+            <a:r>
+              <a:rPr kumimoji="1" lang="en-US" altLang="ja-JP" dirty="0" smtClean="0"/>
+              <a:t>2.</a:t>
+            </a:r>
+            <a:endParaRPr kumimoji="1" lang="ja-JP" altLang="en-US" dirty="0"/>
+          </a:p>
+        </p:txBody>
+      </p:sp>
+      <p:sp>
+        <p:nvSpPr>
+          <p:cNvPr id="32" name="テキスト ボックス 31"/>
+          <p:cNvSpPr txBox="1"/>
+          <p:nvPr/>
+        </p:nvSpPr>
+        <p:spPr>
+          <a:xfrm>
+            <a:off x="2029522" y="5664820"/>
+            <a:ext cx="535259" cy="369332"/>
+          </a:xfrm>
+          <a:prstGeom prst="rect">
+            <a:avLst/>
+          </a:prstGeom>
+          <a:noFill/>
+        </p:spPr>
+        <p:txBody>
+          <a:bodyPr wrap="square" rtlCol="0">
+            <a:spAutoFit/>
+          </a:bodyPr>
+          <a:lstStyle/>
+          <a:p>
+            <a:r>
+              <a:rPr kumimoji="1" lang="en-US" altLang="ja-JP" dirty="0" smtClean="0"/>
+              <a:t>3.</a:t>
+            </a:r>
+            <a:endParaRPr kumimoji="1" lang="ja-JP" altLang="en-US" dirty="0"/>
+          </a:p>
+        </p:txBody>
+      </p:sp>
+      <p:sp>
+        <p:nvSpPr>
+          <p:cNvPr id="33" name="テキスト ボックス 32"/>
+          <p:cNvSpPr txBox="1"/>
+          <p:nvPr/>
+        </p:nvSpPr>
+        <p:spPr>
+          <a:xfrm>
+            <a:off x="2163337" y="3044283"/>
+            <a:ext cx="1761892" cy="369332"/>
+          </a:xfrm>
+          <a:prstGeom prst="rect">
+            <a:avLst/>
+          </a:prstGeom>
+          <a:noFill/>
+        </p:spPr>
+        <p:txBody>
+          <a:bodyPr wrap="square" rtlCol="0">
+            <a:spAutoFit/>
+          </a:bodyPr>
+          <a:lstStyle/>
+          <a:p>
+            <a:r>
+              <a:rPr kumimoji="1" lang="en-US" altLang="ja-JP" dirty="0" smtClean="0"/>
+              <a:t>Training set</a:t>
             </a:r>
             <a:r>
               <a:rPr kumimoji="1" lang="ja-JP" altLang="en-US" dirty="0" smtClean="0"/>
-              <a:t>の例</a:t>
+              <a:t>側</a:t>
+            </a:r>
+            <a:endParaRPr kumimoji="1" lang="ja-JP" altLang="en-US" dirty="0"/>
+          </a:p>
+        </p:txBody>
+      </p:sp>
+      <p:sp>
+        <p:nvSpPr>
+          <p:cNvPr id="34" name="テキスト ボックス 33"/>
+          <p:cNvSpPr txBox="1"/>
+          <p:nvPr/>
+        </p:nvSpPr>
+        <p:spPr>
+          <a:xfrm>
+            <a:off x="2575932" y="4895385"/>
+            <a:ext cx="1906858" cy="369332"/>
+          </a:xfrm>
+          <a:prstGeom prst="rect">
+            <a:avLst/>
+          </a:prstGeom>
+          <a:noFill/>
+        </p:spPr>
+        <p:txBody>
+          <a:bodyPr wrap="square" rtlCol="0">
+            <a:spAutoFit/>
+          </a:bodyPr>
+          <a:lstStyle/>
+          <a:p>
+            <a:r>
+              <a:rPr kumimoji="1" lang="en-US" altLang="ja-JP" dirty="0" smtClean="0"/>
+              <a:t>Test set</a:t>
+            </a:r>
+            <a:r>
+              <a:rPr kumimoji="1" lang="ja-JP" altLang="en-US" dirty="0" smtClean="0"/>
+              <a:t>側</a:t>
             </a:r>
             <a:endParaRPr kumimoji="1" lang="ja-JP" altLang="en-US" dirty="0"/>
           </a:p>
@@ -3598,7 +4019,7 @@
     </p:spTree>
     <p:extLst>
       <p:ext uri="{BB962C8B-B14F-4D97-AF65-F5344CB8AC3E}">
-        <p14:creationId xmlns:p14="http://schemas.microsoft.com/office/powerpoint/2010/main" val="153583362"/>
+        <p14:creationId xmlns:p14="http://schemas.microsoft.com/office/powerpoint/2010/main" val="3185461743"/>
       </p:ext>
     </p:extLst>
   </p:cSld>
@@ -3642,7 +4063,156 @@
           <a:p>
             <a:r>
               <a:rPr kumimoji="1" lang="en-US" altLang="ja-JP" dirty="0" smtClean="0"/>
-              <a:t>Iris data set</a:t>
+              <a:t>appendix</a:t>
+            </a:r>
+            <a:endParaRPr kumimoji="1" lang="ja-JP" altLang="en-US" dirty="0"/>
+          </a:p>
+        </p:txBody>
+      </p:sp>
+      <p:sp>
+        <p:nvSpPr>
+          <p:cNvPr id="3" name="コンテンツ プレースホルダー 2"/>
+          <p:cNvSpPr>
+            <a:spLocks noGrp="1"/>
+          </p:cNvSpPr>
+          <p:nvPr>
+            <p:ph idx="1"/>
+          </p:nvPr>
+        </p:nvSpPr>
+        <p:spPr/>
+        <p:txBody>
+          <a:bodyPr/>
+          <a:lstStyle/>
+          <a:p>
+            <a:r>
+              <a:rPr kumimoji="1" lang="en-US" altLang="ja-JP" dirty="0" smtClean="0"/>
+              <a:t>Preprocessing</a:t>
+            </a:r>
+            <a:r>
+              <a:rPr kumimoji="1" lang="ja-JP" altLang="en-US" dirty="0" smtClean="0"/>
+              <a:t>を</a:t>
+            </a:r>
+            <a:r>
+              <a:rPr kumimoji="1" lang="en-US" altLang="ja-JP" dirty="0" smtClean="0"/>
+              <a:t>training/test set</a:t>
+            </a:r>
+            <a:r>
+              <a:rPr kumimoji="1" lang="ja-JP" altLang="en-US" dirty="0" smtClean="0"/>
+              <a:t>に対して行いたい。</a:t>
+            </a:r>
+            <a:endParaRPr kumimoji="1" lang="ja-JP" altLang="en-US" dirty="0"/>
+          </a:p>
+        </p:txBody>
+      </p:sp>
+    </p:spTree>
+    <p:extLst>
+      <p:ext uri="{BB962C8B-B14F-4D97-AF65-F5344CB8AC3E}">
+        <p14:creationId xmlns:p14="http://schemas.microsoft.com/office/powerpoint/2010/main" val="3600022007"/>
+      </p:ext>
+    </p:extLst>
+  </p:cSld>
+  <p:clrMapOvr>
+    <a:masterClrMapping/>
+  </p:clrMapOvr>
+</p:sld>
+</file>
+
+<file path=ppt/slides/slide13.xml><?xml version="1.0" encoding="utf-8"?>
+<p:sld xmlns:a="http://schemas.openxmlformats.org/drawingml/2006/main" xmlns:r="http://schemas.openxmlformats.org/officeDocument/2006/relationships" xmlns:p="http://schemas.openxmlformats.org/presentationml/2006/main">
+  <p:cSld>
+    <p:spTree>
+      <p:nvGrpSpPr>
+        <p:cNvPr id="1" name=""/>
+        <p:cNvGrpSpPr/>
+        <p:nvPr/>
+      </p:nvGrpSpPr>
+      <p:grpSpPr>
+        <a:xfrm>
+          <a:off x="0" y="0"/>
+          <a:ext cx="0" cy="0"/>
+          <a:chOff x="0" y="0"/>
+          <a:chExt cx="0" cy="0"/>
+        </a:xfrm>
+      </p:grpSpPr>
+      <p:sp>
+        <p:nvSpPr>
+          <p:cNvPr id="2" name="タイトル 1"/>
+          <p:cNvSpPr>
+            <a:spLocks noGrp="1"/>
+          </p:cNvSpPr>
+          <p:nvPr>
+            <p:ph type="title"/>
+          </p:nvPr>
+        </p:nvSpPr>
+        <p:spPr>
+          <a:xfrm>
+            <a:off x="849351" y="164403"/>
+            <a:ext cx="10515600" cy="1325563"/>
+          </a:xfrm>
+        </p:spPr>
+        <p:txBody>
+          <a:bodyPr/>
+          <a:lstStyle/>
+          <a:p>
+            <a:r>
+              <a:rPr lang="en-US" altLang="ja-JP" dirty="0"/>
+              <a:t>Training/test set</a:t>
+            </a:r>
+            <a:r>
+              <a:rPr lang="ja-JP" altLang="en-US" dirty="0"/>
+              <a:t>の</a:t>
+            </a:r>
+            <a:r>
+              <a:rPr lang="en-US" altLang="ja-JP" dirty="0" smtClean="0"/>
+              <a:t>preprocessing(1)</a:t>
+            </a:r>
+            <a:endParaRPr kumimoji="1" lang="ja-JP" altLang="en-US" dirty="0"/>
+          </a:p>
+        </p:txBody>
+      </p:sp>
+      <p:sp>
+        <p:nvSpPr>
+          <p:cNvPr id="3" name="コンテンツ プレースホルダー 2"/>
+          <p:cNvSpPr>
+            <a:spLocks noGrp="1"/>
+          </p:cNvSpPr>
+          <p:nvPr>
+            <p:ph idx="1"/>
+          </p:nvPr>
+        </p:nvSpPr>
+        <p:spPr>
+          <a:xfrm>
+            <a:off x="827049" y="1468786"/>
+            <a:ext cx="10515600" cy="4351338"/>
+          </a:xfrm>
+        </p:spPr>
+        <p:txBody>
+          <a:bodyPr/>
+          <a:lstStyle/>
+          <a:p>
+            <a:r>
+              <a:rPr kumimoji="1" lang="en-US" altLang="ja-JP" dirty="0" smtClean="0"/>
+              <a:t>Data</a:t>
+            </a:r>
+            <a:r>
+              <a:rPr kumimoji="1" lang="ja-JP" altLang="en-US" dirty="0" smtClean="0"/>
+              <a:t>の規格化が必要だった。</a:t>
+            </a:r>
+            <a:r>
+              <a:rPr kumimoji="1" lang="en-US" altLang="ja-JP" dirty="0" smtClean="0"/>
+              <a:t>(</a:t>
+            </a:r>
+            <a:r>
+              <a:rPr kumimoji="1" lang="ja-JP" altLang="en-US" dirty="0" smtClean="0"/>
+              <a:t>以下は</a:t>
+            </a:r>
+            <a:r>
+              <a:rPr kumimoji="1" lang="en-US" altLang="ja-JP" dirty="0" smtClean="0"/>
+              <a:t>Orange</a:t>
+            </a:r>
+            <a:r>
+              <a:rPr kumimoji="1" lang="ja-JP" altLang="en-US" dirty="0" smtClean="0"/>
+              <a:t>では動作しない。）</a:t>
             </a:r>
             <a:endParaRPr kumimoji="1" lang="ja-JP" altLang="en-US" dirty="0"/>
           </a:p>
@@ -3664,38 +4234,228 @@
         </p:blipFill>
         <p:spPr>
           <a:xfrm>
-            <a:off x="4995745" y="2559258"/>
-            <a:ext cx="6874229" cy="3908449"/>
+            <a:off x="991877" y="2099914"/>
+            <a:ext cx="10029825" cy="4657725"/>
           </a:xfrm>
           <a:prstGeom prst="rect">
             <a:avLst/>
           </a:prstGeom>
         </p:spPr>
       </p:pic>
+      <p:sp>
+        <p:nvSpPr>
+          <p:cNvPr id="6" name="テキスト ボックス 5"/>
+          <p:cNvSpPr txBox="1"/>
+          <p:nvPr/>
+        </p:nvSpPr>
+        <p:spPr>
+          <a:xfrm>
+            <a:off x="568712" y="6488668"/>
+            <a:ext cx="5820937" cy="369332"/>
+          </a:xfrm>
+          <a:prstGeom prst="rect">
+            <a:avLst/>
+          </a:prstGeom>
+          <a:noFill/>
+        </p:spPr>
+        <p:txBody>
+          <a:bodyPr wrap="square" rtlCol="0">
+            <a:spAutoFit/>
+          </a:bodyPr>
+          <a:lstStyle/>
+          <a:p>
+            <a:r>
+              <a:rPr kumimoji="1" lang="en-US" altLang="ja-JP" dirty="0" smtClean="0">
+                <a:solidFill>
+                  <a:srgbClr val="FF0000"/>
+                </a:solidFill>
+              </a:rPr>
+              <a:t>Training set</a:t>
+            </a:r>
+            <a:r>
+              <a:rPr kumimoji="1" lang="ja-JP" altLang="en-US" dirty="0" smtClean="0">
+                <a:solidFill>
+                  <a:srgbClr val="FF0000"/>
+                </a:solidFill>
+              </a:rPr>
+              <a:t>と同じ規格化を行いたいのだが・・・。</a:t>
+            </a:r>
+            <a:endParaRPr kumimoji="1" lang="ja-JP" altLang="en-US" dirty="0">
+              <a:solidFill>
+                <a:srgbClr val="FF0000"/>
+              </a:solidFill>
+            </a:endParaRPr>
+          </a:p>
+        </p:txBody>
+      </p:sp>
+    </p:spTree>
+    <p:extLst>
+      <p:ext uri="{BB962C8B-B14F-4D97-AF65-F5344CB8AC3E}">
+        <p14:creationId xmlns:p14="http://schemas.microsoft.com/office/powerpoint/2010/main" val="2173626743"/>
+      </p:ext>
+    </p:extLst>
+  </p:cSld>
+  <p:clrMapOvr>
+    <a:masterClrMapping/>
+  </p:clrMapOvr>
+</p:sld>
+</file>
+
+<file path=ppt/slides/slide14.xml><?xml version="1.0" encoding="utf-8"?>
+<p:sld xmlns:a="http://schemas.openxmlformats.org/drawingml/2006/main" xmlns:r="http://schemas.openxmlformats.org/officeDocument/2006/relationships" xmlns:p="http://schemas.openxmlformats.org/presentationml/2006/main">
+  <p:cSld>
+    <p:spTree>
+      <p:nvGrpSpPr>
+        <p:cNvPr id="1" name=""/>
+        <p:cNvGrpSpPr/>
+        <p:nvPr/>
+      </p:nvGrpSpPr>
+      <p:grpSpPr>
+        <a:xfrm>
+          <a:off x="0" y="0"/>
+          <a:ext cx="0" cy="0"/>
+          <a:chOff x="0" y="0"/>
+          <a:chExt cx="0" cy="0"/>
+        </a:xfrm>
+      </p:grpSpPr>
+      <p:sp>
+        <p:nvSpPr>
+          <p:cNvPr id="2" name="タイトル 1"/>
+          <p:cNvSpPr>
+            <a:spLocks noGrp="1"/>
+          </p:cNvSpPr>
+          <p:nvPr>
+            <p:ph type="title"/>
+          </p:nvPr>
+        </p:nvSpPr>
+        <p:spPr>
+          <a:xfrm>
+            <a:off x="793595" y="0"/>
+            <a:ext cx="10515600" cy="1325563"/>
+          </a:xfrm>
+        </p:spPr>
+        <p:txBody>
+          <a:bodyPr/>
+          <a:lstStyle/>
+          <a:p>
+            <a:r>
+              <a:rPr kumimoji="1" lang="en-US" altLang="ja-JP" dirty="0" smtClean="0"/>
+              <a:t>Training/test set</a:t>
+            </a:r>
+            <a:r>
+              <a:rPr kumimoji="1" lang="ja-JP" altLang="en-US" dirty="0" smtClean="0"/>
+              <a:t>の</a:t>
+            </a:r>
+            <a:r>
+              <a:rPr kumimoji="1" lang="en-US" altLang="ja-JP" dirty="0" smtClean="0"/>
+              <a:t>preprocessing(2)</a:t>
+            </a:r>
+            <a:endParaRPr kumimoji="1" lang="ja-JP" altLang="en-US" dirty="0"/>
+          </a:p>
+        </p:txBody>
+      </p:sp>
+      <p:sp>
+        <p:nvSpPr>
+          <p:cNvPr id="3" name="コンテンツ プレースホルダー 2"/>
+          <p:cNvSpPr>
+            <a:spLocks noGrp="1"/>
+          </p:cNvSpPr>
+          <p:nvPr>
+            <p:ph idx="1"/>
+          </p:nvPr>
+        </p:nvSpPr>
+        <p:spPr>
+          <a:xfrm>
+            <a:off x="760141" y="1557996"/>
+            <a:ext cx="10515600" cy="4351338"/>
+          </a:xfrm>
+        </p:spPr>
+        <p:txBody>
+          <a:bodyPr/>
+          <a:lstStyle/>
+          <a:p>
+            <a:r>
+              <a:rPr kumimoji="1" lang="ja-JP" altLang="en-US" dirty="0" smtClean="0"/>
+              <a:t>同じ規格化を行いたい場合は</a:t>
+            </a:r>
+            <a:r>
+              <a:rPr kumimoji="1" lang="en-US" altLang="ja-JP" dirty="0" smtClean="0"/>
+              <a:t>?</a:t>
+            </a:r>
+            <a:endParaRPr kumimoji="1" lang="ja-JP" altLang="en-US" dirty="0"/>
+          </a:p>
+        </p:txBody>
+      </p:sp>
       <p:pic>
         <p:nvPicPr>
-          <p:cNvPr id="5" name="図 4"/>
+          <p:cNvPr id="4" name="図 3"/>
           <p:cNvPicPr>
             <a:picLocks noChangeAspect="1"/>
           </p:cNvPicPr>
           <p:nvPr/>
         </p:nvPicPr>
         <p:blipFill>
-          <a:blip r:embed="rId3"/>
+          <a:blip r:embed="rId2"/>
           <a:stretch>
             <a:fillRect/>
           </a:stretch>
         </p:blipFill>
         <p:spPr>
           <a:xfrm>
-            <a:off x="980843" y="1484854"/>
-            <a:ext cx="2781300" cy="1457325"/>
+            <a:off x="988509" y="2207128"/>
+            <a:ext cx="9925050" cy="4562475"/>
           </a:xfrm>
           <a:prstGeom prst="rect">
             <a:avLst/>
           </a:prstGeom>
         </p:spPr>
       </p:pic>
+      <p:sp>
+        <p:nvSpPr>
+          <p:cNvPr id="5" name="テキスト ボックス 4"/>
+          <p:cNvSpPr txBox="1"/>
+          <p:nvPr/>
+        </p:nvSpPr>
+        <p:spPr>
+          <a:xfrm>
+            <a:off x="2653991" y="5653669"/>
+            <a:ext cx="1616927" cy="923330"/>
+          </a:xfrm>
+          <a:prstGeom prst="rect">
+            <a:avLst/>
+          </a:prstGeom>
+          <a:noFill/>
+        </p:spPr>
+        <p:txBody>
+          <a:bodyPr wrap="square" rtlCol="0">
+            <a:spAutoFit/>
+          </a:bodyPr>
+          <a:lstStyle/>
+          <a:p>
+            <a:r>
+              <a:rPr lang="en-US" altLang="ja-JP" dirty="0" smtClean="0">
+                <a:solidFill>
+                  <a:srgbClr val="FF0000"/>
+                </a:solidFill>
+              </a:rPr>
+              <a:t>Data table</a:t>
+            </a:r>
+            <a:r>
+              <a:rPr lang="ja-JP" altLang="en-US" dirty="0" smtClean="0">
+                <a:solidFill>
+                  <a:srgbClr val="FF0000"/>
+                </a:solidFill>
+              </a:rPr>
+              <a:t>の選択で対応するしかない。</a:t>
+            </a:r>
+            <a:endParaRPr kumimoji="1" lang="ja-JP" altLang="en-US" dirty="0">
+              <a:solidFill>
+                <a:srgbClr val="FF0000"/>
+              </a:solidFill>
+            </a:endParaRPr>
+          </a:p>
+        </p:txBody>
+      </p:sp>
       <p:cxnSp>
         <p:nvCxnSpPr>
           <p:cNvPr id="7" name="直線矢印コネクタ 6"/>
@@ -3703,14 +4463,14 @@
           <p:nvPr/>
         </p:nvCxnSpPr>
         <p:spPr>
-          <a:xfrm>
-            <a:off x="3222702" y="2040673"/>
-            <a:ext cx="1739590" cy="836341"/>
+          <a:xfrm flipV="1">
+            <a:off x="3507060" y="4014439"/>
+            <a:ext cx="630043" cy="1639230"/>
           </a:xfrm>
           <a:prstGeom prst="straightConnector1">
             <a:avLst/>
           </a:prstGeom>
-          <a:ln>
+          <a:ln w="76200">
             <a:tailEnd type="triangle"/>
           </a:ln>
         </p:spPr>
@@ -3729,16 +4489,136 @@
           </a:fontRef>
         </p:style>
       </p:cxnSp>
-      <p:sp>
-        <p:nvSpPr>
-          <p:cNvPr id="8" name="テキスト ボックス 7"/>
+      <p:cxnSp>
+        <p:nvCxnSpPr>
+          <p:cNvPr id="9" name="直線矢印コネクタ 8"/>
+          <p:cNvCxnSpPr>
+            <a:stCxn id="5" idx="0"/>
+          </p:cNvCxnSpPr>
+          <p:nvPr/>
+        </p:nvCxnSpPr>
+        <p:spPr>
+          <a:xfrm flipV="1">
+            <a:off x="3462455" y="5386039"/>
+            <a:ext cx="1165301" cy="267630"/>
+          </a:xfrm>
+          <a:prstGeom prst="straightConnector1">
+            <a:avLst/>
+          </a:prstGeom>
+          <a:ln w="76200">
+            <a:tailEnd type="triangle"/>
+          </a:ln>
+        </p:spPr>
+        <p:style>
+          <a:lnRef idx="1">
+            <a:schemeClr val="accent2"/>
+          </a:lnRef>
+          <a:fillRef idx="0">
+            <a:schemeClr val="accent2"/>
+          </a:fillRef>
+          <a:effectRef idx="0">
+            <a:schemeClr val="accent2"/>
+          </a:effectRef>
+          <a:fontRef idx="minor">
+            <a:schemeClr val="tx1"/>
+          </a:fontRef>
+        </p:style>
+      </p:cxnSp>
+    </p:spTree>
+    <p:extLst>
+      <p:ext uri="{BB962C8B-B14F-4D97-AF65-F5344CB8AC3E}">
+        <p14:creationId xmlns:p14="http://schemas.microsoft.com/office/powerpoint/2010/main" val="4038885160"/>
+      </p:ext>
+    </p:extLst>
+  </p:cSld>
+  <p:clrMapOvr>
+    <a:masterClrMapping/>
+  </p:clrMapOvr>
+</p:sld>
+</file>
+
+<file path=ppt/slides/slide15.xml><?xml version="1.0" encoding="utf-8"?>
+<p:sld xmlns:a="http://schemas.openxmlformats.org/drawingml/2006/main" xmlns:r="http://schemas.openxmlformats.org/officeDocument/2006/relationships" xmlns:p="http://schemas.openxmlformats.org/presentationml/2006/main">
+  <p:cSld>
+    <p:spTree>
+      <p:nvGrpSpPr>
+        <p:cNvPr id="1" name=""/>
+        <p:cNvGrpSpPr/>
+        <p:nvPr/>
+      </p:nvGrpSpPr>
+      <p:grpSpPr>
+        <a:xfrm>
+          <a:off x="0" y="0"/>
+          <a:ext cx="0" cy="0"/>
+          <a:chOff x="0" y="0"/>
+          <a:chExt cx="0" cy="0"/>
+        </a:xfrm>
+      </p:grpSpPr>
+      <p:sp>
+        <p:nvSpPr>
+          <p:cNvPr id="2" name="タイトル 1"/>
+          <p:cNvSpPr>
+            <a:spLocks noGrp="1"/>
+          </p:cNvSpPr>
+          <p:nvPr>
+            <p:ph type="title"/>
+          </p:nvPr>
+        </p:nvSpPr>
+        <p:spPr/>
+        <p:txBody>
+          <a:bodyPr/>
+          <a:lstStyle/>
+          <a:p>
+            <a:r>
+              <a:rPr lang="en-US" altLang="ja-JP" dirty="0"/>
+              <a:t>Training/test set</a:t>
+            </a:r>
+            <a:r>
+              <a:rPr lang="ja-JP" altLang="en-US" dirty="0"/>
+              <a:t>の</a:t>
+            </a:r>
+            <a:r>
+              <a:rPr lang="en-US" altLang="ja-JP" dirty="0" smtClean="0"/>
+              <a:t>preprocessing(3)</a:t>
+            </a:r>
+            <a:endParaRPr kumimoji="1" lang="ja-JP" altLang="en-US" dirty="0"/>
+          </a:p>
+        </p:txBody>
+      </p:sp>
+      <p:pic>
+        <p:nvPicPr>
+          <p:cNvPr id="4" name="図 3"/>
+          <p:cNvPicPr>
+            <a:picLocks noChangeAspect="1"/>
+          </p:cNvPicPr>
+          <p:nvPr/>
+        </p:nvPicPr>
+        <p:blipFill>
+          <a:blip r:embed="rId2"/>
+          <a:stretch>
+            <a:fillRect/>
+          </a:stretch>
+        </p:blipFill>
+        <p:spPr>
+          <a:xfrm>
+            <a:off x="2799651" y="2479866"/>
+            <a:ext cx="7105650" cy="2924175"/>
+          </a:xfrm>
+          <a:prstGeom prst="rect">
+            <a:avLst/>
+          </a:prstGeom>
+        </p:spPr>
+      </p:pic>
+      <p:sp>
+        <p:nvSpPr>
+          <p:cNvPr id="5" name="テキスト ボックス 4"/>
           <p:cNvSpPr txBox="1"/>
           <p:nvPr/>
         </p:nvSpPr>
         <p:spPr>
           <a:xfrm>
-            <a:off x="5653668" y="1483114"/>
-            <a:ext cx="5419493" cy="646331"/>
+            <a:off x="3222703" y="2174488"/>
+            <a:ext cx="2542478" cy="369332"/>
           </a:xfrm>
           <a:prstGeom prst="rect">
             <a:avLst/>
@@ -3753,12 +4633,387 @@
           <a:p>
             <a:r>
               <a:rPr kumimoji="1" lang="en-US" altLang="ja-JP" dirty="0" smtClean="0"/>
+              <a:t>Training set</a:t>
+            </a:r>
+            <a:endParaRPr kumimoji="1" lang="ja-JP" altLang="en-US" dirty="0"/>
+          </a:p>
+        </p:txBody>
+      </p:sp>
+      <p:sp>
+        <p:nvSpPr>
+          <p:cNvPr id="6" name="テキスト ボックス 5"/>
+          <p:cNvSpPr txBox="1"/>
+          <p:nvPr/>
+        </p:nvSpPr>
+        <p:spPr>
+          <a:xfrm>
+            <a:off x="3475463" y="4122233"/>
+            <a:ext cx="2542478" cy="369332"/>
+          </a:xfrm>
+          <a:prstGeom prst="rect">
+            <a:avLst/>
+          </a:prstGeom>
+          <a:noFill/>
+        </p:spPr>
+        <p:txBody>
+          <a:bodyPr wrap="square" rtlCol="0">
+            <a:spAutoFit/>
+          </a:bodyPr>
+          <a:lstStyle/>
+          <a:p>
+            <a:r>
+              <a:rPr kumimoji="1" lang="en-US" altLang="ja-JP" dirty="0" smtClean="0"/>
+              <a:t>Test set</a:t>
+            </a:r>
+            <a:endParaRPr kumimoji="1" lang="ja-JP" altLang="en-US" dirty="0"/>
+          </a:p>
+        </p:txBody>
+      </p:sp>
+      <p:sp>
+        <p:nvSpPr>
+          <p:cNvPr id="7" name="テキスト ボックス 6"/>
+          <p:cNvSpPr txBox="1"/>
+          <p:nvPr/>
+        </p:nvSpPr>
+        <p:spPr>
+          <a:xfrm>
+            <a:off x="524107" y="3557239"/>
+            <a:ext cx="1973766" cy="1200329"/>
+          </a:xfrm>
+          <a:prstGeom prst="rect">
+            <a:avLst/>
+          </a:prstGeom>
+          <a:noFill/>
+        </p:spPr>
+        <p:txBody>
+          <a:bodyPr wrap="square" rtlCol="0">
+            <a:spAutoFit/>
+          </a:bodyPr>
+          <a:lstStyle/>
+          <a:p>
+            <a:r>
+              <a:rPr kumimoji="1" lang="en-US" altLang="ja-JP" dirty="0" smtClean="0"/>
+              <a:t>Preprocessing</a:t>
+            </a:r>
+            <a:r>
+              <a:rPr kumimoji="1" lang="ja-JP" altLang="en-US" dirty="0" smtClean="0"/>
+              <a:t>は</a:t>
+            </a:r>
+            <a:endParaRPr kumimoji="1" lang="en-US" altLang="ja-JP" dirty="0" smtClean="0"/>
+          </a:p>
+          <a:p>
+            <a:r>
+              <a:rPr kumimoji="1" lang="en-US" altLang="ja-JP" dirty="0" smtClean="0"/>
+              <a:t>Orange</a:t>
+            </a:r>
+            <a:r>
+              <a:rPr lang="ja-JP" altLang="en-US" dirty="0" smtClean="0"/>
+              <a:t>の動作前に別途行った方が良い。</a:t>
+            </a:r>
+            <a:endParaRPr kumimoji="1" lang="ja-JP" altLang="en-US" dirty="0"/>
+          </a:p>
+        </p:txBody>
+      </p:sp>
+      <p:cxnSp>
+        <p:nvCxnSpPr>
+          <p:cNvPr id="9" name="直線矢印コネクタ 8"/>
+          <p:cNvCxnSpPr/>
+          <p:nvPr/>
+        </p:nvCxnSpPr>
+        <p:spPr>
+          <a:xfrm flipV="1">
+            <a:off x="2430966" y="3245005"/>
+            <a:ext cx="512956" cy="568712"/>
+          </a:xfrm>
+          <a:prstGeom prst="straightConnector1">
+            <a:avLst/>
+          </a:prstGeom>
+          <a:ln>
+            <a:tailEnd type="triangle"/>
+          </a:ln>
+        </p:spPr>
+        <p:style>
+          <a:lnRef idx="1">
+            <a:schemeClr val="accent1"/>
+          </a:lnRef>
+          <a:fillRef idx="0">
+            <a:schemeClr val="accent1"/>
+          </a:fillRef>
+          <a:effectRef idx="0">
+            <a:schemeClr val="accent1"/>
+          </a:effectRef>
+          <a:fontRef idx="minor">
+            <a:schemeClr val="tx1"/>
+          </a:fontRef>
+        </p:style>
+      </p:cxnSp>
+      <p:cxnSp>
+        <p:nvCxnSpPr>
+          <p:cNvPr id="11" name="直線矢印コネクタ 10"/>
+          <p:cNvCxnSpPr/>
+          <p:nvPr/>
+        </p:nvCxnSpPr>
+        <p:spPr>
+          <a:xfrm>
+            <a:off x="2442117" y="3769112"/>
+            <a:ext cx="825190" cy="1037064"/>
+          </a:xfrm>
+          <a:prstGeom prst="straightConnector1">
+            <a:avLst/>
+          </a:prstGeom>
+          <a:ln>
+            <a:tailEnd type="triangle"/>
+          </a:ln>
+        </p:spPr>
+        <p:style>
+          <a:lnRef idx="1">
+            <a:schemeClr val="accent1"/>
+          </a:lnRef>
+          <a:fillRef idx="0">
+            <a:schemeClr val="accent1"/>
+          </a:fillRef>
+          <a:effectRef idx="0">
+            <a:schemeClr val="accent1"/>
+          </a:effectRef>
+          <a:fontRef idx="minor">
+            <a:schemeClr val="tx1"/>
+          </a:fontRef>
+        </p:style>
+      </p:cxnSp>
+    </p:spTree>
+    <p:extLst>
+      <p:ext uri="{BB962C8B-B14F-4D97-AF65-F5344CB8AC3E}">
+        <p14:creationId xmlns:p14="http://schemas.microsoft.com/office/powerpoint/2010/main" val="1829740073"/>
+      </p:ext>
+    </p:extLst>
+  </p:cSld>
+  <p:clrMapOvr>
+    <a:masterClrMapping/>
+  </p:clrMapOvr>
+</p:sld>
+</file>
+
+<file path=ppt/slides/slide16.xml><?xml version="1.0" encoding="utf-8"?>
+<p:sld xmlns:a="http://schemas.openxmlformats.org/drawingml/2006/main" xmlns:r="http://schemas.openxmlformats.org/officeDocument/2006/relationships" xmlns:p="http://schemas.openxmlformats.org/presentationml/2006/main">
+  <p:cSld>
+    <p:spTree>
+      <p:nvGrpSpPr>
+        <p:cNvPr id="1" name=""/>
+        <p:cNvGrpSpPr/>
+        <p:nvPr/>
+      </p:nvGrpSpPr>
+      <p:grpSpPr>
+        <a:xfrm>
+          <a:off x="0" y="0"/>
+          <a:ext cx="0" cy="0"/>
+          <a:chOff x="0" y="0"/>
+          <a:chExt cx="0" cy="0"/>
+        </a:xfrm>
+      </p:grpSpPr>
+      <p:sp>
+        <p:nvSpPr>
+          <p:cNvPr id="2" name="タイトル 1"/>
+          <p:cNvSpPr>
+            <a:spLocks noGrp="1"/>
+          </p:cNvSpPr>
+          <p:nvPr>
+            <p:ph type="title"/>
+          </p:nvPr>
+        </p:nvSpPr>
+        <p:spPr>
+          <a:xfrm>
+            <a:off x="748990" y="2840696"/>
+            <a:ext cx="10515600" cy="1325563"/>
+          </a:xfrm>
+        </p:spPr>
+        <p:txBody>
+          <a:bodyPr/>
+          <a:lstStyle/>
+          <a:p>
+            <a:pPr algn="ctr"/>
+            <a:r>
+              <a:rPr kumimoji="1" lang="en-US" altLang="ja-JP" dirty="0" smtClean="0"/>
+              <a:t>Classification</a:t>
+            </a:r>
+            <a:r>
+              <a:rPr kumimoji="1" lang="ja-JP" altLang="en-US" dirty="0" smtClean="0"/>
+              <a:t>の例</a:t>
+            </a:r>
+            <a:endParaRPr kumimoji="1" lang="ja-JP" altLang="en-US" dirty="0"/>
+          </a:p>
+        </p:txBody>
+      </p:sp>
+    </p:spTree>
+    <p:extLst>
+      <p:ext uri="{BB962C8B-B14F-4D97-AF65-F5344CB8AC3E}">
+        <p14:creationId xmlns:p14="http://schemas.microsoft.com/office/powerpoint/2010/main" val="153583362"/>
+      </p:ext>
+    </p:extLst>
+  </p:cSld>
+  <p:clrMapOvr>
+    <a:masterClrMapping/>
+  </p:clrMapOvr>
+</p:sld>
+</file>
+
+<file path=ppt/slides/slide17.xml><?xml version="1.0" encoding="utf-8"?>
+<p:sld xmlns:a="http://schemas.openxmlformats.org/drawingml/2006/main" xmlns:r="http://schemas.openxmlformats.org/officeDocument/2006/relationships" xmlns:p="http://schemas.openxmlformats.org/presentationml/2006/main">
+  <p:cSld>
+    <p:spTree>
+      <p:nvGrpSpPr>
+        <p:cNvPr id="1" name=""/>
+        <p:cNvGrpSpPr/>
+        <p:nvPr/>
+      </p:nvGrpSpPr>
+      <p:grpSpPr>
+        <a:xfrm>
+          <a:off x="0" y="0"/>
+          <a:ext cx="0" cy="0"/>
+          <a:chOff x="0" y="0"/>
+          <a:chExt cx="0" cy="0"/>
+        </a:xfrm>
+      </p:grpSpPr>
+      <p:sp>
+        <p:nvSpPr>
+          <p:cNvPr id="2" name="タイトル 1"/>
+          <p:cNvSpPr>
+            <a:spLocks noGrp="1"/>
+          </p:cNvSpPr>
+          <p:nvPr>
+            <p:ph type="title"/>
+          </p:nvPr>
+        </p:nvSpPr>
+        <p:spPr/>
+        <p:txBody>
+          <a:bodyPr/>
+          <a:lstStyle/>
+          <a:p>
+            <a:r>
+              <a:rPr kumimoji="1" lang="en-US" altLang="ja-JP" dirty="0" smtClean="0"/>
+              <a:t>Iris data set</a:t>
+            </a:r>
+            <a:endParaRPr kumimoji="1" lang="ja-JP" altLang="en-US" dirty="0"/>
+          </a:p>
+        </p:txBody>
+      </p:sp>
+      <p:pic>
+        <p:nvPicPr>
+          <p:cNvPr id="4" name="図 3"/>
+          <p:cNvPicPr>
+            <a:picLocks noChangeAspect="1"/>
+          </p:cNvPicPr>
+          <p:nvPr/>
+        </p:nvPicPr>
+        <p:blipFill>
+          <a:blip r:embed="rId2"/>
+          <a:stretch>
+            <a:fillRect/>
+          </a:stretch>
+        </p:blipFill>
+        <p:spPr>
+          <a:xfrm>
+            <a:off x="4995745" y="2559258"/>
+            <a:ext cx="6874229" cy="3908449"/>
+          </a:xfrm>
+          <a:prstGeom prst="rect">
+            <a:avLst/>
+          </a:prstGeom>
+        </p:spPr>
+      </p:pic>
+      <p:pic>
+        <p:nvPicPr>
+          <p:cNvPr id="5" name="図 4"/>
+          <p:cNvPicPr>
+            <a:picLocks noChangeAspect="1"/>
+          </p:cNvPicPr>
+          <p:nvPr/>
+        </p:nvPicPr>
+        <p:blipFill>
+          <a:blip r:embed="rId3"/>
+          <a:stretch>
+            <a:fillRect/>
+          </a:stretch>
+        </p:blipFill>
+        <p:spPr>
+          <a:xfrm>
+            <a:off x="980843" y="1484854"/>
+            <a:ext cx="2781300" cy="1457325"/>
+          </a:xfrm>
+          <a:prstGeom prst="rect">
+            <a:avLst/>
+          </a:prstGeom>
+        </p:spPr>
+      </p:pic>
+      <p:cxnSp>
+        <p:nvCxnSpPr>
+          <p:cNvPr id="7" name="直線矢印コネクタ 6"/>
+          <p:cNvCxnSpPr/>
+          <p:nvPr/>
+        </p:nvCxnSpPr>
+        <p:spPr>
+          <a:xfrm>
+            <a:off x="3222702" y="2040673"/>
+            <a:ext cx="1739590" cy="836341"/>
+          </a:xfrm>
+          <a:prstGeom prst="straightConnector1">
+            <a:avLst/>
+          </a:prstGeom>
+          <a:ln>
+            <a:tailEnd type="triangle"/>
+          </a:ln>
+        </p:spPr>
+        <p:style>
+          <a:lnRef idx="1">
+            <a:schemeClr val="accent2"/>
+          </a:lnRef>
+          <a:fillRef idx="0">
+            <a:schemeClr val="accent2"/>
+          </a:fillRef>
+          <a:effectRef idx="0">
+            <a:schemeClr val="accent2"/>
+          </a:effectRef>
+          <a:fontRef idx="minor">
+            <a:schemeClr val="tx1"/>
+          </a:fontRef>
+        </p:style>
+      </p:cxnSp>
+      <p:sp>
+        <p:nvSpPr>
+          <p:cNvPr id="8" name="テキスト ボックス 7"/>
+          <p:cNvSpPr txBox="1"/>
+          <p:nvPr/>
+        </p:nvSpPr>
+        <p:spPr>
+          <a:xfrm>
+            <a:off x="5218770" y="1103972"/>
+            <a:ext cx="5419493" cy="923330"/>
+          </a:xfrm>
+          <a:prstGeom prst="rect">
+            <a:avLst/>
+          </a:prstGeom>
+          <a:noFill/>
+        </p:spPr>
+        <p:txBody>
+          <a:bodyPr wrap="square" rtlCol="0">
+            <a:spAutoFit/>
+          </a:bodyPr>
+          <a:lstStyle/>
+          <a:p>
+            <a:r>
+              <a:rPr kumimoji="1" lang="en-US" altLang="ja-JP" dirty="0" smtClean="0"/>
               <a:t>X=4</a:t>
             </a:r>
             <a:r>
               <a:rPr kumimoji="1" lang="ja-JP" altLang="en-US" dirty="0" smtClean="0"/>
-              <a:t>次元数値データ</a:t>
-            </a:r>
+              <a:t>次元数値</a:t>
+            </a:r>
+            <a:r>
+              <a:rPr kumimoji="1" lang="ja-JP" altLang="en-US" dirty="0" smtClean="0"/>
+              <a:t>データ</a:t>
+            </a:r>
+            <a:endParaRPr kumimoji="1" lang="en-US" altLang="ja-JP" dirty="0" smtClean="0"/>
+          </a:p>
+          <a:p>
             <a:endParaRPr kumimoji="1" lang="en-US" altLang="ja-JP" dirty="0" smtClean="0"/>
           </a:p>
           <a:p>
@@ -3771,20 +5026,12 @@
               <a:t>分類</a:t>
             </a:r>
             <a:r>
-              <a:rPr kumimoji="1" lang="en-US" altLang="ja-JP" dirty="0" smtClean="0"/>
-              <a:t>(</a:t>
-            </a:r>
-            <a:r>
-              <a:rPr kumimoji="1" lang="en-US" altLang="ja-JP" dirty="0" err="1" smtClean="0"/>
-              <a:t>setosam,vesicolor,virginica</a:t>
-            </a:r>
-            <a:r>
-              <a:rPr kumimoji="1" lang="en-US" altLang="ja-JP" dirty="0" smtClean="0"/>
-              <a:t>)</a:t>
-            </a:r>
-            <a:r>
               <a:rPr lang="ja-JP" altLang="en-US" dirty="0" smtClean="0"/>
-              <a:t>を持つ</a:t>
+              <a:t>を</a:t>
+            </a:r>
+            <a:r>
+              <a:rPr lang="ja-JP" altLang="en-US" dirty="0" smtClean="0"/>
+              <a:t>持つ</a:t>
             </a:r>
             <a:r>
               <a:rPr kumimoji="1" lang="ja-JP" altLang="en-US" dirty="0" smtClean="0"/>
@@ -3897,6 +5144,254 @@
           </a:p>
         </p:txBody>
       </p:sp>
+      <p:sp>
+        <p:nvSpPr>
+          <p:cNvPr id="3" name="正方形/長方形 2"/>
+          <p:cNvSpPr/>
+          <p:nvPr/>
+        </p:nvSpPr>
+        <p:spPr>
+          <a:xfrm>
+            <a:off x="6170952" y="1348627"/>
+            <a:ext cx="4020652" cy="369332"/>
+          </a:xfrm>
+          <a:prstGeom prst="rect">
+            <a:avLst/>
+          </a:prstGeom>
+        </p:spPr>
+        <p:txBody>
+          <a:bodyPr wrap="none">
+            <a:spAutoFit/>
+          </a:bodyPr>
+          <a:lstStyle/>
+          <a:p>
+            <a:r>
+              <a:rPr lang="en-US" altLang="ja-JP" dirty="0">
+                <a:solidFill>
+                  <a:srgbClr val="626264"/>
+                </a:solidFill>
+                <a:latin typeface="Arial" panose="020B0604020202020204" pitchFamily="34" charset="0"/>
+              </a:rPr>
+              <a:t>sepal (</a:t>
+            </a:r>
+            <a:r>
+              <a:rPr lang="ja-JP" altLang="en-US" dirty="0" err="1">
+                <a:solidFill>
+                  <a:srgbClr val="626264"/>
+                </a:solidFill>
+                <a:latin typeface="Arial" panose="020B0604020202020204" pitchFamily="34" charset="0"/>
+              </a:rPr>
+              <a:t>がく</a:t>
+            </a:r>
+            <a:r>
+              <a:rPr lang="ja-JP" altLang="en-US" dirty="0">
+                <a:solidFill>
+                  <a:srgbClr val="626264"/>
+                </a:solidFill>
+                <a:latin typeface="Arial" panose="020B0604020202020204" pitchFamily="34" charset="0"/>
+              </a:rPr>
+              <a:t>片</a:t>
+            </a:r>
+            <a:r>
+              <a:rPr lang="en-US" altLang="ja-JP" dirty="0">
+                <a:solidFill>
+                  <a:srgbClr val="626264"/>
+                </a:solidFill>
+                <a:latin typeface="Arial" panose="020B0604020202020204" pitchFamily="34" charset="0"/>
+              </a:rPr>
+              <a:t>) </a:t>
+            </a:r>
+            <a:r>
+              <a:rPr lang="ja-JP" altLang="en-US" dirty="0">
+                <a:solidFill>
+                  <a:srgbClr val="626264"/>
+                </a:solidFill>
+                <a:latin typeface="Arial" panose="020B0604020202020204" pitchFamily="34" charset="0"/>
+              </a:rPr>
+              <a:t>と</a:t>
+            </a:r>
+            <a:r>
+              <a:rPr lang="en-US" altLang="ja-JP" dirty="0">
+                <a:solidFill>
+                  <a:srgbClr val="626264"/>
+                </a:solidFill>
+                <a:latin typeface="Arial" panose="020B0604020202020204" pitchFamily="34" charset="0"/>
+              </a:rPr>
+              <a:t>petal (</a:t>
+            </a:r>
+            <a:r>
+              <a:rPr lang="ja-JP" altLang="en-US" dirty="0">
+                <a:solidFill>
+                  <a:srgbClr val="626264"/>
+                </a:solidFill>
+                <a:latin typeface="Arial" panose="020B0604020202020204" pitchFamily="34" charset="0"/>
+              </a:rPr>
+              <a:t>花弁</a:t>
+            </a:r>
+            <a:r>
+              <a:rPr lang="en-US" altLang="ja-JP" dirty="0">
+                <a:solidFill>
+                  <a:srgbClr val="626264"/>
+                </a:solidFill>
+                <a:latin typeface="Arial" panose="020B0604020202020204" pitchFamily="34" charset="0"/>
+              </a:rPr>
+              <a:t>) </a:t>
+            </a:r>
+            <a:r>
+              <a:rPr lang="ja-JP" altLang="en-US" dirty="0">
+                <a:solidFill>
+                  <a:srgbClr val="626264"/>
+                </a:solidFill>
+                <a:latin typeface="Arial" panose="020B0604020202020204" pitchFamily="34" charset="0"/>
+              </a:rPr>
+              <a:t>の長さ・幅</a:t>
+            </a:r>
+            <a:endParaRPr lang="ja-JP" altLang="en-US" dirty="0"/>
+          </a:p>
+        </p:txBody>
+      </p:sp>
+      <p:sp>
+        <p:nvSpPr>
+          <p:cNvPr id="6" name="正方形/長方形 5"/>
+          <p:cNvSpPr/>
+          <p:nvPr/>
+        </p:nvSpPr>
+        <p:spPr>
+          <a:xfrm>
+            <a:off x="6059606" y="2040001"/>
+            <a:ext cx="5759910" cy="369332"/>
+          </a:xfrm>
+          <a:prstGeom prst="rect">
+            <a:avLst/>
+          </a:prstGeom>
+        </p:spPr>
+        <p:txBody>
+          <a:bodyPr wrap="none">
+            <a:spAutoFit/>
+          </a:bodyPr>
+          <a:lstStyle/>
+          <a:p>
+            <a:r>
+              <a:rPr lang="ja-JP" altLang="en-US" dirty="0">
+                <a:solidFill>
+                  <a:srgbClr val="656769"/>
+                </a:solidFill>
+                <a:latin typeface="Arial" panose="020B0604020202020204" pitchFamily="34" charset="0"/>
+              </a:rPr>
+              <a:t>アヤメ</a:t>
+            </a:r>
+            <a:r>
+              <a:rPr lang="ja-JP" altLang="en-US" dirty="0">
+                <a:solidFill>
+                  <a:srgbClr val="626264"/>
+                </a:solidFill>
+                <a:latin typeface="Arial" panose="020B0604020202020204" pitchFamily="34" charset="0"/>
+              </a:rPr>
+              <a:t>属の</a:t>
+            </a:r>
+            <a:r>
+              <a:rPr lang="en-US" altLang="ja-JP" dirty="0">
+                <a:solidFill>
+                  <a:srgbClr val="626264"/>
+                </a:solidFill>
+                <a:latin typeface="Arial" panose="020B0604020202020204" pitchFamily="34" charset="0"/>
+              </a:rPr>
+              <a:t>3</a:t>
+            </a:r>
+            <a:r>
+              <a:rPr lang="ja-JP" altLang="en-US" dirty="0">
+                <a:solidFill>
+                  <a:srgbClr val="626264"/>
+                </a:solidFill>
+                <a:latin typeface="Arial" panose="020B0604020202020204" pitchFamily="34" charset="0"/>
+              </a:rPr>
+              <a:t>種 </a:t>
+            </a:r>
+            <a:r>
+              <a:rPr lang="en-US" altLang="ja-JP" dirty="0">
+                <a:solidFill>
+                  <a:srgbClr val="626264"/>
+                </a:solidFill>
+                <a:latin typeface="Arial" panose="020B0604020202020204" pitchFamily="34" charset="0"/>
+              </a:rPr>
+              <a:t>(</a:t>
+            </a:r>
+            <a:r>
+              <a:rPr lang="en-US" altLang="ja-JP" i="1" dirty="0">
+                <a:solidFill>
+                  <a:srgbClr val="626264"/>
+                </a:solidFill>
+                <a:latin typeface="Arial" panose="020B0604020202020204" pitchFamily="34" charset="0"/>
+              </a:rPr>
+              <a:t>Iris </a:t>
+            </a:r>
+            <a:r>
+              <a:rPr lang="en-US" altLang="ja-JP" i="1" dirty="0" err="1">
+                <a:solidFill>
+                  <a:srgbClr val="626264"/>
+                </a:solidFill>
+                <a:latin typeface="Arial" panose="020B0604020202020204" pitchFamily="34" charset="0"/>
+              </a:rPr>
+              <a:t>setosa</a:t>
+            </a:r>
+            <a:r>
+              <a:rPr lang="ja-JP" altLang="en-US" dirty="0" err="1">
+                <a:solidFill>
+                  <a:srgbClr val="626264"/>
+                </a:solidFill>
+                <a:latin typeface="Arial" panose="020B0604020202020204" pitchFamily="34" charset="0"/>
+              </a:rPr>
+              <a:t>，</a:t>
+            </a:r>
+            <a:r>
+              <a:rPr lang="en-US" altLang="ja-JP" i="1" dirty="0">
+                <a:solidFill>
+                  <a:srgbClr val="626264"/>
+                </a:solidFill>
+                <a:latin typeface="Arial" panose="020B0604020202020204" pitchFamily="34" charset="0"/>
+              </a:rPr>
+              <a:t>Iris versicolor</a:t>
+            </a:r>
+            <a:r>
+              <a:rPr lang="ja-JP" altLang="en-US" dirty="0" err="1">
+                <a:solidFill>
+                  <a:srgbClr val="626264"/>
+                </a:solidFill>
+                <a:latin typeface="Arial" panose="020B0604020202020204" pitchFamily="34" charset="0"/>
+              </a:rPr>
+              <a:t>，</a:t>
+            </a:r>
+            <a:r>
+              <a:rPr lang="en-US" altLang="ja-JP" i="1" dirty="0">
+                <a:solidFill>
+                  <a:srgbClr val="626264"/>
+                </a:solidFill>
+                <a:latin typeface="Arial" panose="020B0604020202020204" pitchFamily="34" charset="0"/>
+              </a:rPr>
+              <a:t>Iris </a:t>
+            </a:r>
+            <a:r>
+              <a:rPr lang="en-US" altLang="ja-JP" i="1" dirty="0" err="1">
+                <a:solidFill>
+                  <a:srgbClr val="626264"/>
+                </a:solidFill>
+                <a:latin typeface="Arial" panose="020B0604020202020204" pitchFamily="34" charset="0"/>
+              </a:rPr>
+              <a:t>virginica</a:t>
+            </a:r>
+            <a:r>
+              <a:rPr lang="en-US" altLang="ja-JP" dirty="0">
+                <a:solidFill>
+                  <a:srgbClr val="626264"/>
+                </a:solidFill>
+                <a:latin typeface="Arial" panose="020B0604020202020204" pitchFamily="34" charset="0"/>
+              </a:rPr>
+              <a:t>)</a:t>
+            </a:r>
+            <a:endParaRPr lang="ja-JP" altLang="en-US" dirty="0"/>
+          </a:p>
+        </p:txBody>
+      </p:sp>
     </p:spTree>
     <p:extLst>
       <p:ext uri="{BB962C8B-B14F-4D97-AF65-F5344CB8AC3E}">
@@ -3910,7 +5405,7 @@
 </p:sld>
 </file>
 
-<file path=ppt/slides/slide13.xml><?xml version="1.0" encoding="utf-8"?>
+<file path=ppt/slides/slide18.xml><?xml version="1.0" encoding="utf-8"?>
 <p:sld xmlns:a="http://schemas.openxmlformats.org/drawingml/2006/main" xmlns:r="http://schemas.openxmlformats.org/officeDocument/2006/relationships" xmlns:p="http://schemas.openxmlformats.org/presentationml/2006/main">
   <p:cSld>
     <p:spTree>
@@ -4044,7 +5539,7 @@
 </p:sld>
 </file>
 
-<file path=ppt/slides/slide14.xml><?xml version="1.0" encoding="utf-8"?>
+<file path=ppt/slides/slide19.xml><?xml version="1.0" encoding="utf-8"?>
 <p:sld xmlns:a="http://schemas.openxmlformats.org/drawingml/2006/main" xmlns:r="http://schemas.openxmlformats.org/officeDocument/2006/relationships" xmlns:p="http://schemas.openxmlformats.org/presentationml/2006/main">
   <p:cSld>
     <p:spTree>
@@ -4677,7 +6172,366 @@
 </p:sld>
 </file>
 
-<file path=ppt/slides/slide15.xml><?xml version="1.0" encoding="utf-8"?>
+<file path=ppt/slides/slide2.xml><?xml version="1.0" encoding="utf-8"?>
+<p:sld xmlns:a="http://schemas.openxmlformats.org/drawingml/2006/main" xmlns:r="http://schemas.openxmlformats.org/officeDocument/2006/relationships" xmlns:p="http://schemas.openxmlformats.org/presentationml/2006/main">
+  <p:cSld>
+    <p:spTree>
+      <p:nvGrpSpPr>
+        <p:cNvPr id="1" name=""/>
+        <p:cNvGrpSpPr/>
+        <p:nvPr/>
+      </p:nvGrpSpPr>
+      <p:grpSpPr>
+        <a:xfrm>
+          <a:off x="0" y="0"/>
+          <a:ext cx="0" cy="0"/>
+          <a:chOff x="0" y="0"/>
+          <a:chExt cx="0" cy="0"/>
+        </a:xfrm>
+      </p:grpSpPr>
+      <p:sp>
+        <p:nvSpPr>
+          <p:cNvPr id="2" name="タイトル 1"/>
+          <p:cNvSpPr>
+            <a:spLocks noGrp="1"/>
+          </p:cNvSpPr>
+          <p:nvPr>
+            <p:ph type="title"/>
+          </p:nvPr>
+        </p:nvSpPr>
+        <p:spPr/>
+        <p:txBody>
+          <a:bodyPr/>
+          <a:lstStyle/>
+          <a:p>
+            <a:r>
+              <a:rPr kumimoji="1" lang="ja-JP" altLang="en-US" dirty="0" smtClean="0"/>
+              <a:t>最初は何をどうすればよいのか分からない。</a:t>
+            </a:r>
+            <a:endParaRPr kumimoji="1" lang="ja-JP" altLang="en-US" dirty="0"/>
+          </a:p>
+        </p:txBody>
+      </p:sp>
+      <p:pic>
+        <p:nvPicPr>
+          <p:cNvPr id="3" name="図 2"/>
+          <p:cNvPicPr>
+            <a:picLocks noChangeAspect="1"/>
+          </p:cNvPicPr>
+          <p:nvPr/>
+        </p:nvPicPr>
+        <p:blipFill>
+          <a:blip r:embed="rId2"/>
+          <a:stretch>
+            <a:fillRect/>
+          </a:stretch>
+        </p:blipFill>
+        <p:spPr>
+          <a:xfrm>
+            <a:off x="2503714" y="2150608"/>
+            <a:ext cx="6385561" cy="4561115"/>
+          </a:xfrm>
+          <a:prstGeom prst="rect">
+            <a:avLst/>
+          </a:prstGeom>
+        </p:spPr>
+      </p:pic>
+      <p:sp>
+        <p:nvSpPr>
+          <p:cNvPr id="6" name="テキスト ボックス 5"/>
+          <p:cNvSpPr txBox="1"/>
+          <p:nvPr/>
+        </p:nvSpPr>
+        <p:spPr>
+          <a:xfrm>
+            <a:off x="2884715" y="1709057"/>
+            <a:ext cx="1981200" cy="369332"/>
+          </a:xfrm>
+          <a:prstGeom prst="rect">
+            <a:avLst/>
+          </a:prstGeom>
+          <a:noFill/>
+        </p:spPr>
+        <p:txBody>
+          <a:bodyPr wrap="square" rtlCol="0">
+            <a:spAutoFit/>
+          </a:bodyPr>
+          <a:lstStyle/>
+          <a:p>
+            <a:r>
+              <a:rPr kumimoji="1" lang="en-US" altLang="ja-JP" dirty="0" smtClean="0"/>
+              <a:t>Output slot</a:t>
+            </a:r>
+            <a:r>
+              <a:rPr kumimoji="1" lang="ja-JP" altLang="en-US" dirty="0" smtClean="0"/>
+              <a:t>のみ</a:t>
+            </a:r>
+            <a:endParaRPr kumimoji="1" lang="ja-JP" altLang="en-US" dirty="0"/>
+          </a:p>
+        </p:txBody>
+      </p:sp>
+      <p:sp>
+        <p:nvSpPr>
+          <p:cNvPr id="7" name="テキスト ボックス 6"/>
+          <p:cNvSpPr txBox="1"/>
+          <p:nvPr/>
+        </p:nvSpPr>
+        <p:spPr>
+          <a:xfrm>
+            <a:off x="5203371" y="1502229"/>
+            <a:ext cx="1393372" cy="646331"/>
+          </a:xfrm>
+          <a:prstGeom prst="rect">
+            <a:avLst/>
+          </a:prstGeom>
+          <a:noFill/>
+        </p:spPr>
+        <p:txBody>
+          <a:bodyPr wrap="square" rtlCol="0">
+            <a:spAutoFit/>
+          </a:bodyPr>
+          <a:lstStyle/>
+          <a:p>
+            <a:r>
+              <a:rPr kumimoji="1" lang="en-US" altLang="ja-JP" dirty="0" smtClean="0"/>
+              <a:t>Input &amp; output slot</a:t>
+            </a:r>
+            <a:endParaRPr kumimoji="1" lang="ja-JP" altLang="en-US" dirty="0"/>
+          </a:p>
+        </p:txBody>
+      </p:sp>
+      <p:sp>
+        <p:nvSpPr>
+          <p:cNvPr id="9" name="テキスト ボックス 8"/>
+          <p:cNvSpPr txBox="1"/>
+          <p:nvPr/>
+        </p:nvSpPr>
+        <p:spPr>
+          <a:xfrm>
+            <a:off x="7130143" y="1654629"/>
+            <a:ext cx="1981200" cy="369332"/>
+          </a:xfrm>
+          <a:prstGeom prst="rect">
+            <a:avLst/>
+          </a:prstGeom>
+          <a:noFill/>
+        </p:spPr>
+        <p:txBody>
+          <a:bodyPr wrap="square" rtlCol="0">
+            <a:spAutoFit/>
+          </a:bodyPr>
+          <a:lstStyle/>
+          <a:p>
+            <a:r>
+              <a:rPr kumimoji="1" lang="en-US" altLang="ja-JP" dirty="0" smtClean="0"/>
+              <a:t>input slot</a:t>
+            </a:r>
+            <a:r>
+              <a:rPr kumimoji="1" lang="ja-JP" altLang="en-US" dirty="0" smtClean="0"/>
+              <a:t>のみ</a:t>
+            </a:r>
+            <a:endParaRPr kumimoji="1" lang="ja-JP" altLang="en-US" dirty="0"/>
+          </a:p>
+        </p:txBody>
+      </p:sp>
+      <p:sp>
+        <p:nvSpPr>
+          <p:cNvPr id="13" name="円/楕円 12"/>
+          <p:cNvSpPr/>
+          <p:nvPr/>
+        </p:nvSpPr>
+        <p:spPr>
+          <a:xfrm>
+            <a:off x="3668487" y="2492829"/>
+            <a:ext cx="359228" cy="816428"/>
+          </a:xfrm>
+          <a:prstGeom prst="ellipse">
+            <a:avLst/>
+          </a:prstGeom>
+          <a:noFill/>
+          <a:ln>
+            <a:solidFill>
+              <a:srgbClr val="FF0000"/>
+            </a:solidFill>
+          </a:ln>
+        </p:spPr>
+        <p:style>
+          <a:lnRef idx="2">
+            <a:schemeClr val="accent1">
+              <a:shade val="50000"/>
+            </a:schemeClr>
+          </a:lnRef>
+          <a:fillRef idx="1">
+            <a:schemeClr val="accent1"/>
+          </a:fillRef>
+          <a:effectRef idx="0">
+            <a:schemeClr val="accent1"/>
+          </a:effectRef>
+          <a:fontRef idx="minor">
+            <a:schemeClr val="lt1"/>
+          </a:fontRef>
+        </p:style>
+        <p:txBody>
+          <a:bodyPr rtlCol="0" anchor="ctr"/>
+          <a:lstStyle/>
+          <a:p>
+            <a:pPr algn="ctr"/>
+            <a:endParaRPr kumimoji="1" lang="ja-JP" altLang="en-US"/>
+          </a:p>
+        </p:txBody>
+      </p:sp>
+      <p:sp>
+        <p:nvSpPr>
+          <p:cNvPr id="14" name="円/楕円 13"/>
+          <p:cNvSpPr/>
+          <p:nvPr/>
+        </p:nvSpPr>
+        <p:spPr>
+          <a:xfrm>
+            <a:off x="7489372" y="2416629"/>
+            <a:ext cx="359228" cy="816428"/>
+          </a:xfrm>
+          <a:prstGeom prst="ellipse">
+            <a:avLst/>
+          </a:prstGeom>
+          <a:noFill/>
+          <a:ln>
+            <a:solidFill>
+              <a:srgbClr val="FF0000"/>
+            </a:solidFill>
+          </a:ln>
+        </p:spPr>
+        <p:style>
+          <a:lnRef idx="2">
+            <a:schemeClr val="accent1">
+              <a:shade val="50000"/>
+            </a:schemeClr>
+          </a:lnRef>
+          <a:fillRef idx="1">
+            <a:schemeClr val="accent1"/>
+          </a:fillRef>
+          <a:effectRef idx="0">
+            <a:schemeClr val="accent1"/>
+          </a:effectRef>
+          <a:fontRef idx="minor">
+            <a:schemeClr val="lt1"/>
+          </a:fontRef>
+        </p:style>
+        <p:txBody>
+          <a:bodyPr rtlCol="0" anchor="ctr"/>
+          <a:lstStyle/>
+          <a:p>
+            <a:pPr algn="ctr"/>
+            <a:endParaRPr kumimoji="1" lang="ja-JP" altLang="en-US"/>
+          </a:p>
+        </p:txBody>
+      </p:sp>
+      <p:sp>
+        <p:nvSpPr>
+          <p:cNvPr id="15" name="円/楕円 14"/>
+          <p:cNvSpPr/>
+          <p:nvPr/>
+        </p:nvSpPr>
+        <p:spPr>
+          <a:xfrm>
+            <a:off x="5214258" y="2383972"/>
+            <a:ext cx="359228" cy="816428"/>
+          </a:xfrm>
+          <a:prstGeom prst="ellipse">
+            <a:avLst/>
+          </a:prstGeom>
+          <a:noFill/>
+          <a:ln>
+            <a:solidFill>
+              <a:srgbClr val="FF0000"/>
+            </a:solidFill>
+          </a:ln>
+        </p:spPr>
+        <p:style>
+          <a:lnRef idx="2">
+            <a:schemeClr val="accent1">
+              <a:shade val="50000"/>
+            </a:schemeClr>
+          </a:lnRef>
+          <a:fillRef idx="1">
+            <a:schemeClr val="accent1"/>
+          </a:fillRef>
+          <a:effectRef idx="0">
+            <a:schemeClr val="accent1"/>
+          </a:effectRef>
+          <a:fontRef idx="minor">
+            <a:schemeClr val="lt1"/>
+          </a:fontRef>
+        </p:style>
+        <p:txBody>
+          <a:bodyPr rtlCol="0" anchor="ctr"/>
+          <a:lstStyle/>
+          <a:p>
+            <a:pPr algn="ctr"/>
+            <a:endParaRPr kumimoji="1" lang="ja-JP" altLang="en-US"/>
+          </a:p>
+        </p:txBody>
+      </p:sp>
+      <p:sp>
+        <p:nvSpPr>
+          <p:cNvPr id="16" name="円/楕円 15"/>
+          <p:cNvSpPr/>
+          <p:nvPr/>
+        </p:nvSpPr>
+        <p:spPr>
+          <a:xfrm>
+            <a:off x="5900058" y="2394858"/>
+            <a:ext cx="359228" cy="816428"/>
+          </a:xfrm>
+          <a:prstGeom prst="ellipse">
+            <a:avLst/>
+          </a:prstGeom>
+          <a:noFill/>
+          <a:ln>
+            <a:solidFill>
+              <a:srgbClr val="FF0000"/>
+            </a:solidFill>
+          </a:ln>
+        </p:spPr>
+        <p:style>
+          <a:lnRef idx="2">
+            <a:schemeClr val="accent1">
+              <a:shade val="50000"/>
+            </a:schemeClr>
+          </a:lnRef>
+          <a:fillRef idx="1">
+            <a:schemeClr val="accent1"/>
+          </a:fillRef>
+          <a:effectRef idx="0">
+            <a:schemeClr val="accent1"/>
+          </a:effectRef>
+          <a:fontRef idx="minor">
+            <a:schemeClr val="lt1"/>
+          </a:fontRef>
+        </p:style>
+        <p:txBody>
+          <a:bodyPr rtlCol="0" anchor="ctr"/>
+          <a:lstStyle/>
+          <a:p>
+            <a:pPr algn="ctr"/>
+            <a:endParaRPr kumimoji="1" lang="ja-JP" altLang="en-US"/>
+          </a:p>
+        </p:txBody>
+      </p:sp>
+    </p:spTree>
+    <p:extLst>
+      <p:ext uri="{BB962C8B-B14F-4D97-AF65-F5344CB8AC3E}">
+        <p14:creationId xmlns:p14="http://schemas.microsoft.com/office/powerpoint/2010/main" val="2728439612"/>
+      </p:ext>
+    </p:extLst>
+  </p:cSld>
+  <p:clrMapOvr>
+    <a:masterClrMapping/>
+  </p:clrMapOvr>
+</p:sld>
+</file>
+
+<file path=ppt/slides/slide20.xml><?xml version="1.0" encoding="utf-8"?>
 <p:sld xmlns:a="http://schemas.openxmlformats.org/drawingml/2006/main" xmlns:r="http://schemas.openxmlformats.org/officeDocument/2006/relationships" xmlns:p="http://schemas.openxmlformats.org/presentationml/2006/main">
   <p:cSld>
     <p:spTree>
@@ -5014,7 +6868,7 @@
 </p:sld>
 </file>
 
-<file path=ppt/slides/slide16.xml><?xml version="1.0" encoding="utf-8"?>
+<file path=ppt/slides/slide21.xml><?xml version="1.0" encoding="utf-8"?>
 <p:sld xmlns:a="http://schemas.openxmlformats.org/drawingml/2006/main" xmlns:r="http://schemas.openxmlformats.org/officeDocument/2006/relationships" xmlns:p="http://schemas.openxmlformats.org/presentationml/2006/main">
   <p:cSld>
     <p:spTree>
@@ -5530,7 +7384,7 @@
 </p:sld>
 </file>
 
-<file path=ppt/slides/slide17.xml><?xml version="1.0" encoding="utf-8"?>
+<file path=ppt/slides/slide22.xml><?xml version="1.0" encoding="utf-8"?>
 <p:sld xmlns:a="http://schemas.openxmlformats.org/drawingml/2006/main" xmlns:r="http://schemas.openxmlformats.org/officeDocument/2006/relationships" xmlns:p="http://schemas.openxmlformats.org/presentationml/2006/main">
   <p:cSld>
     <p:spTree>
@@ -5851,7 +7705,7 @@
 </p:sld>
 </file>
 
-<file path=ppt/slides/slide18.xml><?xml version="1.0" encoding="utf-8"?>
+<file path=ppt/slides/slide23.xml><?xml version="1.0" encoding="utf-8"?>
 <p:sld xmlns:a="http://schemas.openxmlformats.org/drawingml/2006/main" xmlns:r="http://schemas.openxmlformats.org/officeDocument/2006/relationships" xmlns:p="http://schemas.openxmlformats.org/presentationml/2006/main">
   <p:cSld>
     <p:spTree>
@@ -6288,7 +8142,7 @@
 </p:sld>
 </file>
 
-<file path=ppt/slides/slide19.xml><?xml version="1.0" encoding="utf-8"?>
+<file path=ppt/slides/slide24.xml><?xml version="1.0" encoding="utf-8"?>
 <p:sld xmlns:a="http://schemas.openxmlformats.org/drawingml/2006/main" xmlns:r="http://schemas.openxmlformats.org/officeDocument/2006/relationships" xmlns:p="http://schemas.openxmlformats.org/presentationml/2006/main">
   <p:cSld>
     <p:spTree>
@@ -6440,366 +8294,7 @@
 </p:sld>
 </file>
 
-<file path=ppt/slides/slide2.xml><?xml version="1.0" encoding="utf-8"?>
-<p:sld xmlns:a="http://schemas.openxmlformats.org/drawingml/2006/main" xmlns:r="http://schemas.openxmlformats.org/officeDocument/2006/relationships" xmlns:p="http://schemas.openxmlformats.org/presentationml/2006/main">
-  <p:cSld>
-    <p:spTree>
-      <p:nvGrpSpPr>
-        <p:cNvPr id="1" name=""/>
-        <p:cNvGrpSpPr/>
-        <p:nvPr/>
-      </p:nvGrpSpPr>
-      <p:grpSpPr>
-        <a:xfrm>
-          <a:off x="0" y="0"/>
-          <a:ext cx="0" cy="0"/>
-          <a:chOff x="0" y="0"/>
-          <a:chExt cx="0" cy="0"/>
-        </a:xfrm>
-      </p:grpSpPr>
-      <p:sp>
-        <p:nvSpPr>
-          <p:cNvPr id="2" name="タイトル 1"/>
-          <p:cNvSpPr>
-            <a:spLocks noGrp="1"/>
-          </p:cNvSpPr>
-          <p:nvPr>
-            <p:ph type="title"/>
-          </p:nvPr>
-        </p:nvSpPr>
-        <p:spPr/>
-        <p:txBody>
-          <a:bodyPr/>
-          <a:lstStyle/>
-          <a:p>
-            <a:r>
-              <a:rPr kumimoji="1" lang="ja-JP" altLang="en-US" dirty="0" smtClean="0"/>
-              <a:t>最初は何をどうすればよいのか分からない。</a:t>
-            </a:r>
-            <a:endParaRPr kumimoji="1" lang="ja-JP" altLang="en-US" dirty="0"/>
-          </a:p>
-        </p:txBody>
-      </p:sp>
-      <p:pic>
-        <p:nvPicPr>
-          <p:cNvPr id="3" name="図 2"/>
-          <p:cNvPicPr>
-            <a:picLocks noChangeAspect="1"/>
-          </p:cNvPicPr>
-          <p:nvPr/>
-        </p:nvPicPr>
-        <p:blipFill>
-          <a:blip r:embed="rId2"/>
-          <a:stretch>
-            <a:fillRect/>
-          </a:stretch>
-        </p:blipFill>
-        <p:spPr>
-          <a:xfrm>
-            <a:off x="2503714" y="2150608"/>
-            <a:ext cx="6385561" cy="4561115"/>
-          </a:xfrm>
-          <a:prstGeom prst="rect">
-            <a:avLst/>
-          </a:prstGeom>
-        </p:spPr>
-      </p:pic>
-      <p:sp>
-        <p:nvSpPr>
-          <p:cNvPr id="6" name="テキスト ボックス 5"/>
-          <p:cNvSpPr txBox="1"/>
-          <p:nvPr/>
-        </p:nvSpPr>
-        <p:spPr>
-          <a:xfrm>
-            <a:off x="2884715" y="1709057"/>
-            <a:ext cx="1981200" cy="369332"/>
-          </a:xfrm>
-          <a:prstGeom prst="rect">
-            <a:avLst/>
-          </a:prstGeom>
-          <a:noFill/>
-        </p:spPr>
-        <p:txBody>
-          <a:bodyPr wrap="square" rtlCol="0">
-            <a:spAutoFit/>
-          </a:bodyPr>
-          <a:lstStyle/>
-          <a:p>
-            <a:r>
-              <a:rPr kumimoji="1" lang="en-US" altLang="ja-JP" dirty="0" smtClean="0"/>
-              <a:t>Output slot</a:t>
-            </a:r>
-            <a:r>
-              <a:rPr kumimoji="1" lang="ja-JP" altLang="en-US" dirty="0" smtClean="0"/>
-              <a:t>のみ</a:t>
-            </a:r>
-            <a:endParaRPr kumimoji="1" lang="ja-JP" altLang="en-US" dirty="0"/>
-          </a:p>
-        </p:txBody>
-      </p:sp>
-      <p:sp>
-        <p:nvSpPr>
-          <p:cNvPr id="7" name="テキスト ボックス 6"/>
-          <p:cNvSpPr txBox="1"/>
-          <p:nvPr/>
-        </p:nvSpPr>
-        <p:spPr>
-          <a:xfrm>
-            <a:off x="5203371" y="1502229"/>
-            <a:ext cx="1393372" cy="646331"/>
-          </a:xfrm>
-          <a:prstGeom prst="rect">
-            <a:avLst/>
-          </a:prstGeom>
-          <a:noFill/>
-        </p:spPr>
-        <p:txBody>
-          <a:bodyPr wrap="square" rtlCol="0">
-            <a:spAutoFit/>
-          </a:bodyPr>
-          <a:lstStyle/>
-          <a:p>
-            <a:r>
-              <a:rPr kumimoji="1" lang="en-US" altLang="ja-JP" dirty="0" smtClean="0"/>
-              <a:t>Input &amp; output slot</a:t>
-            </a:r>
-            <a:endParaRPr kumimoji="1" lang="ja-JP" altLang="en-US" dirty="0"/>
-          </a:p>
-        </p:txBody>
-      </p:sp>
-      <p:sp>
-        <p:nvSpPr>
-          <p:cNvPr id="9" name="テキスト ボックス 8"/>
-          <p:cNvSpPr txBox="1"/>
-          <p:nvPr/>
-        </p:nvSpPr>
-        <p:spPr>
-          <a:xfrm>
-            <a:off x="7130143" y="1654629"/>
-            <a:ext cx="1981200" cy="369332"/>
-          </a:xfrm>
-          <a:prstGeom prst="rect">
-            <a:avLst/>
-          </a:prstGeom>
-          <a:noFill/>
-        </p:spPr>
-        <p:txBody>
-          <a:bodyPr wrap="square" rtlCol="0">
-            <a:spAutoFit/>
-          </a:bodyPr>
-          <a:lstStyle/>
-          <a:p>
-            <a:r>
-              <a:rPr kumimoji="1" lang="en-US" altLang="ja-JP" dirty="0" smtClean="0"/>
-              <a:t>input slot</a:t>
-            </a:r>
-            <a:r>
-              <a:rPr kumimoji="1" lang="ja-JP" altLang="en-US" dirty="0" smtClean="0"/>
-              <a:t>のみ</a:t>
-            </a:r>
-            <a:endParaRPr kumimoji="1" lang="ja-JP" altLang="en-US" dirty="0"/>
-          </a:p>
-        </p:txBody>
-      </p:sp>
-      <p:sp>
-        <p:nvSpPr>
-          <p:cNvPr id="13" name="円/楕円 12"/>
-          <p:cNvSpPr/>
-          <p:nvPr/>
-        </p:nvSpPr>
-        <p:spPr>
-          <a:xfrm>
-            <a:off x="3668487" y="2492829"/>
-            <a:ext cx="359228" cy="816428"/>
-          </a:xfrm>
-          <a:prstGeom prst="ellipse">
-            <a:avLst/>
-          </a:prstGeom>
-          <a:noFill/>
-          <a:ln>
-            <a:solidFill>
-              <a:srgbClr val="FF0000"/>
-            </a:solidFill>
-          </a:ln>
-        </p:spPr>
-        <p:style>
-          <a:lnRef idx="2">
-            <a:schemeClr val="accent1">
-              <a:shade val="50000"/>
-            </a:schemeClr>
-          </a:lnRef>
-          <a:fillRef idx="1">
-            <a:schemeClr val="accent1"/>
-          </a:fillRef>
-          <a:effectRef idx="0">
-            <a:schemeClr val="accent1"/>
-          </a:effectRef>
-          <a:fontRef idx="minor">
-            <a:schemeClr val="lt1"/>
-          </a:fontRef>
-        </p:style>
-        <p:txBody>
-          <a:bodyPr rtlCol="0" anchor="ctr"/>
-          <a:lstStyle/>
-          <a:p>
-            <a:pPr algn="ctr"/>
-            <a:endParaRPr kumimoji="1" lang="ja-JP" altLang="en-US"/>
-          </a:p>
-        </p:txBody>
-      </p:sp>
-      <p:sp>
-        <p:nvSpPr>
-          <p:cNvPr id="14" name="円/楕円 13"/>
-          <p:cNvSpPr/>
-          <p:nvPr/>
-        </p:nvSpPr>
-        <p:spPr>
-          <a:xfrm>
-            <a:off x="7489372" y="2416629"/>
-            <a:ext cx="359228" cy="816428"/>
-          </a:xfrm>
-          <a:prstGeom prst="ellipse">
-            <a:avLst/>
-          </a:prstGeom>
-          <a:noFill/>
-          <a:ln>
-            <a:solidFill>
-              <a:srgbClr val="FF0000"/>
-            </a:solidFill>
-          </a:ln>
-        </p:spPr>
-        <p:style>
-          <a:lnRef idx="2">
-            <a:schemeClr val="accent1">
-              <a:shade val="50000"/>
-            </a:schemeClr>
-          </a:lnRef>
-          <a:fillRef idx="1">
-            <a:schemeClr val="accent1"/>
-          </a:fillRef>
-          <a:effectRef idx="0">
-            <a:schemeClr val="accent1"/>
-          </a:effectRef>
-          <a:fontRef idx="minor">
-            <a:schemeClr val="lt1"/>
-          </a:fontRef>
-        </p:style>
-        <p:txBody>
-          <a:bodyPr rtlCol="0" anchor="ctr"/>
-          <a:lstStyle/>
-          <a:p>
-            <a:pPr algn="ctr"/>
-            <a:endParaRPr kumimoji="1" lang="ja-JP" altLang="en-US"/>
-          </a:p>
-        </p:txBody>
-      </p:sp>
-      <p:sp>
-        <p:nvSpPr>
-          <p:cNvPr id="15" name="円/楕円 14"/>
-          <p:cNvSpPr/>
-          <p:nvPr/>
-        </p:nvSpPr>
-        <p:spPr>
-          <a:xfrm>
-            <a:off x="5214258" y="2383972"/>
-            <a:ext cx="359228" cy="816428"/>
-          </a:xfrm>
-          <a:prstGeom prst="ellipse">
-            <a:avLst/>
-          </a:prstGeom>
-          <a:noFill/>
-          <a:ln>
-            <a:solidFill>
-              <a:srgbClr val="FF0000"/>
-            </a:solidFill>
-          </a:ln>
-        </p:spPr>
-        <p:style>
-          <a:lnRef idx="2">
-            <a:schemeClr val="accent1">
-              <a:shade val="50000"/>
-            </a:schemeClr>
-          </a:lnRef>
-          <a:fillRef idx="1">
-            <a:schemeClr val="accent1"/>
-          </a:fillRef>
-          <a:effectRef idx="0">
-            <a:schemeClr val="accent1"/>
-          </a:effectRef>
-          <a:fontRef idx="minor">
-            <a:schemeClr val="lt1"/>
-          </a:fontRef>
-        </p:style>
-        <p:txBody>
-          <a:bodyPr rtlCol="0" anchor="ctr"/>
-          <a:lstStyle/>
-          <a:p>
-            <a:pPr algn="ctr"/>
-            <a:endParaRPr kumimoji="1" lang="ja-JP" altLang="en-US"/>
-          </a:p>
-        </p:txBody>
-      </p:sp>
-      <p:sp>
-        <p:nvSpPr>
-          <p:cNvPr id="16" name="円/楕円 15"/>
-          <p:cNvSpPr/>
-          <p:nvPr/>
-        </p:nvSpPr>
-        <p:spPr>
-          <a:xfrm>
-            <a:off x="5900058" y="2394858"/>
-            <a:ext cx="359228" cy="816428"/>
-          </a:xfrm>
-          <a:prstGeom prst="ellipse">
-            <a:avLst/>
-          </a:prstGeom>
-          <a:noFill/>
-          <a:ln>
-            <a:solidFill>
-              <a:srgbClr val="FF0000"/>
-            </a:solidFill>
-          </a:ln>
-        </p:spPr>
-        <p:style>
-          <a:lnRef idx="2">
-            <a:schemeClr val="accent1">
-              <a:shade val="50000"/>
-            </a:schemeClr>
-          </a:lnRef>
-          <a:fillRef idx="1">
-            <a:schemeClr val="accent1"/>
-          </a:fillRef>
-          <a:effectRef idx="0">
-            <a:schemeClr val="accent1"/>
-          </a:effectRef>
-          <a:fontRef idx="minor">
-            <a:schemeClr val="lt1"/>
-          </a:fontRef>
-        </p:style>
-        <p:txBody>
-          <a:bodyPr rtlCol="0" anchor="ctr"/>
-          <a:lstStyle/>
-          <a:p>
-            <a:pPr algn="ctr"/>
-            <a:endParaRPr kumimoji="1" lang="ja-JP" altLang="en-US"/>
-          </a:p>
-        </p:txBody>
-      </p:sp>
-    </p:spTree>
-    <p:extLst>
-      <p:ext uri="{BB962C8B-B14F-4D97-AF65-F5344CB8AC3E}">
-        <p14:creationId xmlns:p14="http://schemas.microsoft.com/office/powerpoint/2010/main" val="2728439612"/>
-      </p:ext>
-    </p:extLst>
-  </p:cSld>
-  <p:clrMapOvr>
-    <a:masterClrMapping/>
-  </p:clrMapOvr>
-</p:sld>
-</file>
-
-<file path=ppt/slides/slide20.xml><?xml version="1.0" encoding="utf-8"?>
+<file path=ppt/slides/slide25.xml><?xml version="1.0" encoding="utf-8"?>
 <p:sld xmlns:a="http://schemas.openxmlformats.org/drawingml/2006/main" xmlns:r="http://schemas.openxmlformats.org/officeDocument/2006/relationships" xmlns:p="http://schemas.openxmlformats.org/presentationml/2006/main">
   <p:cSld>
     <p:spTree>
@@ -7065,7 +8560,7 @@
 </p:sld>
 </file>
 
-<file path=ppt/slides/slide21.xml><?xml version="1.0" encoding="utf-8"?>
+<file path=ppt/slides/slide26.xml><?xml version="1.0" encoding="utf-8"?>
 <p:sld xmlns:a="http://schemas.openxmlformats.org/drawingml/2006/main" xmlns:r="http://schemas.openxmlformats.org/officeDocument/2006/relationships" xmlns:p="http://schemas.openxmlformats.org/presentationml/2006/main">
   <p:cSld>
     <p:spTree>
@@ -7103,15 +8598,15 @@
           <a:lstStyle/>
           <a:p>
             <a:r>
-              <a:rPr lang="ja-JP" altLang="en-US" dirty="0" smtClean="0"/>
+              <a:rPr lang="ja-JP" altLang="en-US" dirty="0"/>
               <a:t>応用：</a:t>
             </a:r>
             <a:r>
-              <a:rPr lang="en-US" altLang="ja-JP" dirty="0" smtClean="0"/>
+              <a:rPr lang="en-US" altLang="ja-JP" dirty="0"/>
               <a:t>PCA</a:t>
             </a:r>
             <a:r>
-              <a:rPr lang="ja-JP" altLang="en-US" dirty="0" smtClean="0"/>
+              <a:rPr lang="ja-JP" altLang="en-US" dirty="0"/>
               <a:t>を組み合わせる。</a:t>
             </a:r>
             <a:endParaRPr kumimoji="1" lang="ja-JP" altLang="en-US" dirty="0"/>
@@ -7367,7 +8862,7 @@
 </p:sld>
 </file>
 
-<file path=ppt/slides/slide22.xml><?xml version="1.0" encoding="utf-8"?>
+<file path=ppt/slides/slide27.xml><?xml version="1.0" encoding="utf-8"?>
 <p:sld xmlns:a="http://schemas.openxmlformats.org/drawingml/2006/main" xmlns:r="http://schemas.openxmlformats.org/officeDocument/2006/relationships" xmlns:p="http://schemas.openxmlformats.org/presentationml/2006/main">
   <p:cSld>
     <p:spTree>
@@ -7405,20 +8900,418 @@
           <a:lstStyle/>
           <a:p>
             <a:r>
+              <a:rPr lang="en-US" altLang="ja-JP" dirty="0" smtClean="0"/>
+              <a:t>[</a:t>
+            </a:r>
+            <a:r>
+              <a:rPr lang="en-US" altLang="ja-JP" dirty="0" err="1" smtClean="0"/>
+              <a:t>Test&amp;Score</a:t>
+            </a:r>
+            <a:r>
+              <a:rPr lang="en-US" altLang="ja-JP" dirty="0" smtClean="0"/>
+              <a:t>]?</a:t>
+            </a:r>
+            <a:endParaRPr kumimoji="1" lang="ja-JP" altLang="en-US" dirty="0"/>
+          </a:p>
+        </p:txBody>
+      </p:sp>
+      <p:grpSp>
+        <p:nvGrpSpPr>
+          <p:cNvPr id="7" name="グループ化 6"/>
+          <p:cNvGrpSpPr/>
+          <p:nvPr/>
+        </p:nvGrpSpPr>
+        <p:grpSpPr>
+          <a:xfrm>
+            <a:off x="1057391" y="1029281"/>
+            <a:ext cx="9229725" cy="3305175"/>
+            <a:chOff x="1057391" y="1631447"/>
+            <a:chExt cx="9229725" cy="3305175"/>
+          </a:xfrm>
+        </p:grpSpPr>
+        <p:pic>
+          <p:nvPicPr>
+            <p:cNvPr id="4" name="図 3"/>
+            <p:cNvPicPr>
+              <a:picLocks noChangeAspect="1"/>
+            </p:cNvPicPr>
+            <p:nvPr/>
+          </p:nvPicPr>
+          <p:blipFill>
+            <a:blip r:embed="rId2"/>
+            <a:stretch>
+              <a:fillRect/>
+            </a:stretch>
+          </p:blipFill>
+          <p:spPr>
+            <a:xfrm>
+              <a:off x="1057391" y="1631447"/>
+              <a:ext cx="9229725" cy="3305175"/>
+            </a:xfrm>
+            <a:prstGeom prst="rect">
+              <a:avLst/>
+            </a:prstGeom>
+          </p:spPr>
+        </p:pic>
+        <p:sp>
+          <p:nvSpPr>
+            <p:cNvPr id="5" name="円/楕円 4"/>
+            <p:cNvSpPr/>
+            <p:nvPr/>
+          </p:nvSpPr>
+          <p:spPr>
+            <a:xfrm>
+              <a:off x="2207941" y="2442117"/>
+              <a:ext cx="1048215" cy="1137424"/>
+            </a:xfrm>
+            <a:prstGeom prst="ellipse">
+              <a:avLst/>
+            </a:prstGeom>
+            <a:noFill/>
+            <a:ln>
+              <a:solidFill>
+                <a:srgbClr val="FF0000"/>
+              </a:solidFill>
+              <a:prstDash val="dash"/>
+            </a:ln>
+          </p:spPr>
+          <p:style>
+            <a:lnRef idx="2">
+              <a:schemeClr val="accent1">
+                <a:shade val="50000"/>
+              </a:schemeClr>
+            </a:lnRef>
+            <a:fillRef idx="1">
+              <a:schemeClr val="accent1"/>
+            </a:fillRef>
+            <a:effectRef idx="0">
+              <a:schemeClr val="accent1"/>
+            </a:effectRef>
+            <a:fontRef idx="minor">
+              <a:schemeClr val="lt1"/>
+            </a:fontRef>
+          </p:style>
+          <p:txBody>
+            <a:bodyPr rtlCol="0" anchor="ctr"/>
+            <a:lstStyle/>
+            <a:p>
+              <a:pPr algn="ctr"/>
+              <a:endParaRPr kumimoji="1" lang="ja-JP" altLang="en-US"/>
+            </a:p>
+          </p:txBody>
+        </p:sp>
+      </p:grpSp>
+      <p:pic>
+        <p:nvPicPr>
+          <p:cNvPr id="6" name="図 5"/>
+          <p:cNvPicPr>
+            <a:picLocks noChangeAspect="1"/>
+          </p:cNvPicPr>
+          <p:nvPr/>
+        </p:nvPicPr>
+        <p:blipFill>
+          <a:blip r:embed="rId3"/>
+          <a:stretch>
+            <a:fillRect/>
+          </a:stretch>
+        </p:blipFill>
+        <p:spPr>
+          <a:xfrm>
+            <a:off x="184163" y="4055908"/>
+            <a:ext cx="4030999" cy="2533089"/>
+          </a:xfrm>
+          <a:prstGeom prst="rect">
+            <a:avLst/>
+          </a:prstGeom>
+        </p:spPr>
+      </p:pic>
+      <p:cxnSp>
+        <p:nvCxnSpPr>
+          <p:cNvPr id="9" name="直線矢印コネクタ 8"/>
+          <p:cNvCxnSpPr/>
+          <p:nvPr/>
+        </p:nvCxnSpPr>
+        <p:spPr>
+          <a:xfrm flipH="1">
+            <a:off x="2341756" y="2988527"/>
+            <a:ext cx="200722" cy="1159727"/>
+          </a:xfrm>
+          <a:prstGeom prst="straightConnector1">
+            <a:avLst/>
+          </a:prstGeom>
+          <a:ln>
+            <a:tailEnd type="triangle"/>
+          </a:ln>
+        </p:spPr>
+        <p:style>
+          <a:lnRef idx="1">
+            <a:schemeClr val="accent2"/>
+          </a:lnRef>
+          <a:fillRef idx="0">
+            <a:schemeClr val="accent2"/>
+          </a:fillRef>
+          <a:effectRef idx="0">
+            <a:schemeClr val="accent2"/>
+          </a:effectRef>
+          <a:fontRef idx="minor">
+            <a:schemeClr val="tx1"/>
+          </a:fontRef>
+        </p:style>
+      </p:cxnSp>
+      <p:pic>
+        <p:nvPicPr>
+          <p:cNvPr id="10" name="図 9"/>
+          <p:cNvPicPr>
+            <a:picLocks noChangeAspect="1"/>
+          </p:cNvPicPr>
+          <p:nvPr/>
+        </p:nvPicPr>
+        <p:blipFill>
+          <a:blip r:embed="rId4"/>
+          <a:stretch>
+            <a:fillRect/>
+          </a:stretch>
+        </p:blipFill>
+        <p:spPr>
+          <a:xfrm>
+            <a:off x="8329961" y="4013244"/>
+            <a:ext cx="3666891" cy="2681902"/>
+          </a:xfrm>
+          <a:prstGeom prst="rect">
+            <a:avLst/>
+          </a:prstGeom>
+        </p:spPr>
+      </p:pic>
+      <p:cxnSp>
+        <p:nvCxnSpPr>
+          <p:cNvPr id="12" name="直線矢印コネクタ 11"/>
+          <p:cNvCxnSpPr>
+            <a:endCxn id="10" idx="0"/>
+          </p:cNvCxnSpPr>
+          <p:nvPr/>
+        </p:nvCxnSpPr>
+        <p:spPr>
+          <a:xfrm>
+            <a:off x="9623502" y="2542478"/>
+            <a:ext cx="539905" cy="1470766"/>
+          </a:xfrm>
+          <a:prstGeom prst="straightConnector1">
+            <a:avLst/>
+          </a:prstGeom>
+          <a:ln>
+            <a:tailEnd type="triangle"/>
+          </a:ln>
+        </p:spPr>
+        <p:style>
+          <a:lnRef idx="1">
+            <a:schemeClr val="accent2"/>
+          </a:lnRef>
+          <a:fillRef idx="0">
+            <a:schemeClr val="accent2"/>
+          </a:fillRef>
+          <a:effectRef idx="0">
+            <a:schemeClr val="accent2"/>
+          </a:effectRef>
+          <a:fontRef idx="minor">
+            <a:schemeClr val="tx1"/>
+          </a:fontRef>
+        </p:style>
+      </p:cxnSp>
+      <p:sp>
+        <p:nvSpPr>
+          <p:cNvPr id="3" name="テキスト ボックス 2"/>
+          <p:cNvSpPr txBox="1"/>
+          <p:nvPr/>
+        </p:nvSpPr>
+        <p:spPr>
+          <a:xfrm>
+            <a:off x="2397512" y="4705815"/>
+            <a:ext cx="1750742" cy="646331"/>
+          </a:xfrm>
+          <a:prstGeom prst="rect">
+            <a:avLst/>
+          </a:prstGeom>
+          <a:noFill/>
+        </p:spPr>
+        <p:txBody>
+          <a:bodyPr wrap="square" rtlCol="0">
+            <a:spAutoFit/>
+          </a:bodyPr>
+          <a:lstStyle/>
+          <a:p>
+            <a:r>
+              <a:rPr kumimoji="1" lang="en-US" altLang="ja-JP" dirty="0" smtClean="0"/>
+              <a:t>2 components</a:t>
+            </a:r>
+            <a:r>
+              <a:rPr kumimoji="1" lang="ja-JP" altLang="en-US" dirty="0" smtClean="0"/>
+              <a:t>が選択されている。</a:t>
+            </a:r>
+            <a:endParaRPr kumimoji="1" lang="ja-JP" altLang="en-US" dirty="0"/>
+          </a:p>
+        </p:txBody>
+      </p:sp>
+      <p:sp>
+        <p:nvSpPr>
+          <p:cNvPr id="8" name="テキスト ボックス 7"/>
+          <p:cNvSpPr txBox="1"/>
+          <p:nvPr/>
+        </p:nvSpPr>
+        <p:spPr>
+          <a:xfrm>
+            <a:off x="5319132" y="4460488"/>
+            <a:ext cx="2274849" cy="646331"/>
+          </a:xfrm>
+          <a:prstGeom prst="rect">
+            <a:avLst/>
+          </a:prstGeom>
+          <a:noFill/>
+        </p:spPr>
+        <p:txBody>
+          <a:bodyPr wrap="square" rtlCol="0">
+            <a:spAutoFit/>
+          </a:bodyPr>
+          <a:lstStyle/>
+          <a:p>
+            <a:r>
+              <a:rPr kumimoji="1" lang="en-US" altLang="ja-JP" dirty="0" smtClean="0"/>
+              <a:t>[Predictions]</a:t>
+            </a:r>
+            <a:r>
+              <a:rPr kumimoji="1" lang="ja-JP" altLang="en-US" dirty="0" err="1" smtClean="0"/>
+              <a:t>には</a:t>
+            </a:r>
+            <a:r>
+              <a:rPr kumimoji="1" lang="en-US" altLang="ja-JP" dirty="0" smtClean="0"/>
+              <a:t>predictors</a:t>
+            </a:r>
+            <a:r>
+              <a:rPr kumimoji="1" lang="ja-JP" altLang="en-US" dirty="0" smtClean="0"/>
+              <a:t>の値が必要。</a:t>
+            </a:r>
+            <a:endParaRPr kumimoji="1" lang="ja-JP" altLang="en-US" dirty="0"/>
+          </a:p>
+        </p:txBody>
+      </p:sp>
+      <p:sp>
+        <p:nvSpPr>
+          <p:cNvPr id="13" name="テキスト ボックス 12"/>
+          <p:cNvSpPr txBox="1"/>
+          <p:nvPr/>
+        </p:nvSpPr>
+        <p:spPr>
+          <a:xfrm>
+            <a:off x="6356196" y="1059366"/>
+            <a:ext cx="3546087" cy="646331"/>
+          </a:xfrm>
+          <a:prstGeom prst="rect">
+            <a:avLst/>
+          </a:prstGeom>
+          <a:noFill/>
+        </p:spPr>
+        <p:txBody>
+          <a:bodyPr wrap="square" rtlCol="0">
+            <a:spAutoFit/>
+          </a:bodyPr>
+          <a:lstStyle/>
+          <a:p>
+            <a:r>
+              <a:rPr kumimoji="1" lang="en-US" altLang="ja-JP" dirty="0" smtClean="0"/>
+              <a:t>[</a:t>
+            </a:r>
+            <a:r>
+              <a:rPr lang="en-US" altLang="ja-JP" dirty="0" err="1"/>
+              <a:t>T</a:t>
+            </a:r>
+            <a:r>
+              <a:rPr kumimoji="1" lang="en-US" altLang="ja-JP" dirty="0" err="1" smtClean="0"/>
+              <a:t>est&amp;Score</a:t>
+            </a:r>
+            <a:r>
+              <a:rPr lang="en-US" altLang="ja-JP" dirty="0" smtClean="0"/>
+              <a:t>]</a:t>
+            </a:r>
+            <a:r>
+              <a:rPr lang="ja-JP" altLang="en-US" dirty="0" smtClean="0"/>
+              <a:t>は内部で</a:t>
+            </a:r>
+            <a:r>
+              <a:rPr lang="en-US" altLang="ja-JP" dirty="0" smtClean="0"/>
+              <a:t>predictors</a:t>
+            </a:r>
+            <a:r>
+              <a:rPr lang="ja-JP" altLang="en-US" dirty="0" smtClean="0"/>
+              <a:t>の値を計算する</a:t>
+            </a:r>
+            <a:r>
+              <a:rPr lang="en-US" altLang="ja-JP" dirty="0" smtClean="0"/>
+              <a:t>(=Learner)</a:t>
+            </a:r>
+            <a:endParaRPr kumimoji="1" lang="ja-JP" altLang="en-US" dirty="0"/>
+          </a:p>
+        </p:txBody>
+      </p:sp>
+    </p:spTree>
+    <p:extLst>
+      <p:ext uri="{BB962C8B-B14F-4D97-AF65-F5344CB8AC3E}">
+        <p14:creationId xmlns:p14="http://schemas.microsoft.com/office/powerpoint/2010/main" val="2464511763"/>
+      </p:ext>
+    </p:extLst>
+  </p:cSld>
+  <p:clrMapOvr>
+    <a:masterClrMapping/>
+  </p:clrMapOvr>
+</p:sld>
+</file>
+
+<file path=ppt/slides/slide28.xml><?xml version="1.0" encoding="utf-8"?>
+<p:sld xmlns:a="http://schemas.openxmlformats.org/drawingml/2006/main" xmlns:r="http://schemas.openxmlformats.org/officeDocument/2006/relationships" xmlns:p="http://schemas.openxmlformats.org/presentationml/2006/main">
+  <p:cSld>
+    <p:spTree>
+      <p:nvGrpSpPr>
+        <p:cNvPr id="1" name=""/>
+        <p:cNvGrpSpPr/>
+        <p:nvPr/>
+      </p:nvGrpSpPr>
+      <p:grpSpPr>
+        <a:xfrm>
+          <a:off x="0" y="0"/>
+          <a:ext cx="0" cy="0"/>
+          <a:chOff x="0" y="0"/>
+          <a:chExt cx="0" cy="0"/>
+        </a:xfrm>
+      </p:grpSpPr>
+      <p:sp>
+        <p:nvSpPr>
+          <p:cNvPr id="2" name="タイトル 1"/>
+          <p:cNvSpPr>
+            <a:spLocks noGrp="1"/>
+          </p:cNvSpPr>
+          <p:nvPr>
+            <p:ph type="title"/>
+          </p:nvPr>
+        </p:nvSpPr>
+        <p:spPr>
+          <a:xfrm>
+            <a:off x="838200" y="0"/>
+            <a:ext cx="10515600" cy="1325563"/>
+          </a:xfrm>
+        </p:spPr>
+        <p:txBody>
+          <a:bodyPr/>
+          <a:lstStyle/>
+          <a:p>
+            <a:r>
               <a:rPr lang="ja-JP" altLang="en-US" dirty="0" smtClean="0"/>
               <a:t>応用：</a:t>
             </a:r>
             <a:r>
               <a:rPr lang="en-US" altLang="ja-JP" dirty="0" smtClean="0"/>
-              <a:t>PCA</a:t>
-            </a:r>
-            <a:r>
-              <a:rPr lang="ja-JP" altLang="en-US" dirty="0" smtClean="0"/>
-              <a:t>を組み合わせる。</a:t>
+              <a:t>PCA/3 </a:t>
             </a:r>
             <a:r>
               <a:rPr lang="en-US" altLang="ja-JP" dirty="0" smtClean="0"/>
-              <a:t>3 components</a:t>
+              <a:t>components</a:t>
             </a:r>
             <a:endParaRPr kumimoji="1" lang="ja-JP" altLang="en-US" dirty="0"/>
           </a:p>
@@ -7747,7 +9640,7 @@
 </p:sld>
 </file>
 
-<file path=ppt/slides/slide23.xml><?xml version="1.0" encoding="utf-8"?>
+<file path=ppt/slides/slide29.xml><?xml version="1.0" encoding="utf-8"?>
 <p:sld xmlns:a="http://schemas.openxmlformats.org/drawingml/2006/main" xmlns:r="http://schemas.openxmlformats.org/officeDocument/2006/relationships" xmlns:p="http://schemas.openxmlformats.org/presentationml/2006/main">
   <p:cSld>
     <p:spTree>
@@ -7774,23 +9667,22 @@
             <p:ph type="title"/>
           </p:nvPr>
         </p:nvSpPr>
-        <p:spPr>
-          <a:xfrm>
-            <a:off x="793595" y="0"/>
-            <a:ext cx="10515600" cy="1325563"/>
-          </a:xfrm>
-        </p:spPr>
+        <p:spPr/>
         <p:txBody>
           <a:bodyPr/>
           <a:lstStyle/>
           <a:p>
             <a:r>
               <a:rPr kumimoji="1" lang="en-US" altLang="ja-JP" dirty="0" smtClean="0"/>
-              <a:t>Clustering</a:t>
+              <a:t>Classification: training set</a:t>
             </a:r>
             <a:r>
               <a:rPr kumimoji="1" lang="ja-JP" altLang="en-US" dirty="0" smtClean="0"/>
-              <a:t>の例</a:t>
+              <a:t>と</a:t>
+            </a:r>
+            <a:r>
+              <a:rPr kumimoji="1" lang="en-US" altLang="ja-JP" dirty="0" smtClean="0"/>
+              <a:t>test set</a:t>
             </a:r>
             <a:endParaRPr kumimoji="1" lang="ja-JP" altLang="en-US" dirty="0"/>
           </a:p>
@@ -7812,8 +9704,8 @@
         </p:blipFill>
         <p:spPr>
           <a:xfrm>
-            <a:off x="2107581" y="992458"/>
-            <a:ext cx="6244968" cy="5765181"/>
+            <a:off x="1811260" y="1770372"/>
+            <a:ext cx="8524875" cy="4410075"/>
           </a:xfrm>
           <a:prstGeom prst="rect">
             <a:avLst/>
@@ -7823,7 +9715,7 @@
     </p:spTree>
     <p:extLst>
       <p:ext uri="{BB962C8B-B14F-4D97-AF65-F5344CB8AC3E}">
-        <p14:creationId xmlns:p14="http://schemas.microsoft.com/office/powerpoint/2010/main" val="3443948303"/>
+        <p14:creationId xmlns:p14="http://schemas.microsoft.com/office/powerpoint/2010/main" val="1564975699"/>
       </p:ext>
     </p:extLst>
   </p:cSld>
@@ -8045,6 +9937,92 @@
     <p:extLst>
       <p:ext uri="{BB962C8B-B14F-4D97-AF65-F5344CB8AC3E}">
         <p14:creationId xmlns:p14="http://schemas.microsoft.com/office/powerpoint/2010/main" val="268473806"/>
+      </p:ext>
+    </p:extLst>
+  </p:cSld>
+  <p:clrMapOvr>
+    <a:masterClrMapping/>
+  </p:clrMapOvr>
+</p:sld>
+</file>
+
+<file path=ppt/slides/slide30.xml><?xml version="1.0" encoding="utf-8"?>
+<p:sld xmlns:a="http://schemas.openxmlformats.org/drawingml/2006/main" xmlns:r="http://schemas.openxmlformats.org/officeDocument/2006/relationships" xmlns:p="http://schemas.openxmlformats.org/presentationml/2006/main">
+  <p:cSld>
+    <p:spTree>
+      <p:nvGrpSpPr>
+        <p:cNvPr id="1" name=""/>
+        <p:cNvGrpSpPr/>
+        <p:nvPr/>
+      </p:nvGrpSpPr>
+      <p:grpSpPr>
+        <a:xfrm>
+          <a:off x="0" y="0"/>
+          <a:ext cx="0" cy="0"/>
+          <a:chOff x="0" y="0"/>
+          <a:chExt cx="0" cy="0"/>
+        </a:xfrm>
+      </p:grpSpPr>
+      <p:sp>
+        <p:nvSpPr>
+          <p:cNvPr id="2" name="タイトル 1"/>
+          <p:cNvSpPr>
+            <a:spLocks noGrp="1"/>
+          </p:cNvSpPr>
+          <p:nvPr>
+            <p:ph type="title"/>
+          </p:nvPr>
+        </p:nvSpPr>
+        <p:spPr>
+          <a:xfrm>
+            <a:off x="793595" y="0"/>
+            <a:ext cx="10515600" cy="1325563"/>
+          </a:xfrm>
+        </p:spPr>
+        <p:txBody>
+          <a:bodyPr/>
+          <a:lstStyle/>
+          <a:p>
+            <a:r>
+              <a:rPr kumimoji="1" lang="en-US" altLang="ja-JP" dirty="0" smtClean="0"/>
+              <a:t>Clustering</a:t>
+            </a:r>
+            <a:r>
+              <a:rPr kumimoji="1" lang="ja-JP" altLang="en-US" dirty="0" smtClean="0"/>
+              <a:t>の例</a:t>
+            </a:r>
+            <a:endParaRPr kumimoji="1" lang="ja-JP" altLang="en-US" dirty="0"/>
+          </a:p>
+        </p:txBody>
+      </p:sp>
+      <p:pic>
+        <p:nvPicPr>
+          <p:cNvPr id="4" name="図 3"/>
+          <p:cNvPicPr>
+            <a:picLocks noChangeAspect="1"/>
+          </p:cNvPicPr>
+          <p:nvPr/>
+        </p:nvPicPr>
+        <p:blipFill>
+          <a:blip r:embed="rId2"/>
+          <a:stretch>
+            <a:fillRect/>
+          </a:stretch>
+        </p:blipFill>
+        <p:spPr>
+          <a:xfrm>
+            <a:off x="2107581" y="992458"/>
+            <a:ext cx="6244968" cy="5765181"/>
+          </a:xfrm>
+          <a:prstGeom prst="rect">
+            <a:avLst/>
+          </a:prstGeom>
+        </p:spPr>
+      </p:pic>
+    </p:spTree>
+    <p:extLst>
+      <p:ext uri="{BB962C8B-B14F-4D97-AF65-F5344CB8AC3E}">
+        <p14:creationId xmlns:p14="http://schemas.microsoft.com/office/powerpoint/2010/main" val="3443948303"/>
       </p:ext>
     </p:extLst>
   </p:cSld>

</xml_diff>